<commit_message>
final modifications to Presentation and Report
</commit_message>
<xml_diff>
--- a/Presentation.pptx
+++ b/Presentation.pptx
@@ -5,10 +5,10 @@
     <p:sldMasterId id="2147483684" r:id="rId2"/>
   </p:sldMasterIdLst>
   <p:notesMasterIdLst>
-    <p:notesMasterId r:id="rId26"/>
+    <p:notesMasterId r:id="rId35"/>
   </p:notesMasterIdLst>
   <p:handoutMasterIdLst>
-    <p:handoutMasterId r:id="rId27"/>
+    <p:handoutMasterId r:id="rId36"/>
   </p:handoutMasterIdLst>
   <p:sldIdLst>
     <p:sldId id="265" r:id="rId3"/>
@@ -26,14 +26,23 @@
     <p:sldId id="278" r:id="rId15"/>
     <p:sldId id="279" r:id="rId16"/>
     <p:sldId id="281" r:id="rId17"/>
-    <p:sldId id="280" r:id="rId18"/>
-    <p:sldId id="282" r:id="rId19"/>
-    <p:sldId id="283" r:id="rId20"/>
-    <p:sldId id="284" r:id="rId21"/>
-    <p:sldId id="285" r:id="rId22"/>
-    <p:sldId id="287" r:id="rId23"/>
-    <p:sldId id="274" r:id="rId24"/>
-    <p:sldId id="286" r:id="rId25"/>
+    <p:sldId id="274" r:id="rId18"/>
+    <p:sldId id="296" r:id="rId19"/>
+    <p:sldId id="286" r:id="rId20"/>
+    <p:sldId id="297" r:id="rId21"/>
+    <p:sldId id="289" r:id="rId22"/>
+    <p:sldId id="290" r:id="rId23"/>
+    <p:sldId id="293" r:id="rId24"/>
+    <p:sldId id="291" r:id="rId25"/>
+    <p:sldId id="292" r:id="rId26"/>
+    <p:sldId id="294" r:id="rId27"/>
+    <p:sldId id="295" r:id="rId28"/>
+    <p:sldId id="280" r:id="rId29"/>
+    <p:sldId id="282" r:id="rId30"/>
+    <p:sldId id="283" r:id="rId31"/>
+    <p:sldId id="284" r:id="rId32"/>
+    <p:sldId id="285" r:id="rId33"/>
+    <p:sldId id="287" r:id="rId34"/>
   </p:sldIdLst>
   <p:sldSz cx="12192000" cy="6858000"/>
   <p:notesSz cx="6858000" cy="9144000"/>
@@ -152,14 +161,23 @@
             <p14:sldId id="278"/>
             <p14:sldId id="279"/>
             <p14:sldId id="281"/>
+            <p14:sldId id="274"/>
+            <p14:sldId id="296"/>
+            <p14:sldId id="286"/>
+            <p14:sldId id="297"/>
+            <p14:sldId id="289"/>
+            <p14:sldId id="290"/>
+            <p14:sldId id="293"/>
+            <p14:sldId id="291"/>
+            <p14:sldId id="292"/>
+            <p14:sldId id="294"/>
+            <p14:sldId id="295"/>
             <p14:sldId id="280"/>
             <p14:sldId id="282"/>
             <p14:sldId id="283"/>
             <p14:sldId id="284"/>
             <p14:sldId id="285"/>
             <p14:sldId id="287"/>
-            <p14:sldId id="274"/>
-            <p14:sldId id="286"/>
           </p14:sldIdLst>
         </p14:section>
       </p14:sectionLst>
@@ -267,7 +285,7 @@
           <a:p>
             <a:fld id="{41658A34-83F4-4B2E-BC5A-DE51EE8822F9}" type="datetimeFigureOut">
               <a:rPr lang="en-US" smtClean="0"/>
-              <a:t>7/15/2015</a:t>
+              <a:t>7/16/2015</a:t>
             </a:fld>
             <a:endParaRPr lang="en-US"/>
           </a:p>
@@ -432,7 +450,7 @@
           <a:p>
             <a:fld id="{7F2E1917-0BAF-4687-978A-82FFF05559C3}" type="datetimeFigureOut">
               <a:rPr lang="en-US" smtClean="0"/>
-              <a:t>7/15/2015</a:t>
+              <a:t>7/16/2015</a:t>
             </a:fld>
             <a:endParaRPr lang="en-US"/>
           </a:p>
@@ -734,7 +752,7 @@
           <a:p>
             <a:fld id="{84EAB7D7-3608-4730-B2E2-670834DF882C}" type="datetimeFigureOut">
               <a:rPr lang="en-US" smtClean="0"/>
-              <a:t>7/15/2015</a:t>
+              <a:t>7/16/2015</a:t>
             </a:fld>
             <a:endParaRPr lang="en-US"/>
           </a:p>
@@ -942,7 +960,7 @@
           <a:p>
             <a:fld id="{84EAB7D7-3608-4730-B2E2-670834DF882C}" type="datetimeFigureOut">
               <a:rPr lang="en-US" smtClean="0"/>
-              <a:t>7/15/2015</a:t>
+              <a:t>7/16/2015</a:t>
             </a:fld>
             <a:endParaRPr lang="en-US"/>
           </a:p>
@@ -1129,7 +1147,7 @@
           <a:p>
             <a:fld id="{84EAB7D7-3608-4730-B2E2-670834DF882C}" type="datetimeFigureOut">
               <a:rPr lang="en-US" smtClean="0"/>
-              <a:t>7/15/2015</a:t>
+              <a:t>7/16/2015</a:t>
             </a:fld>
             <a:endParaRPr lang="en-US"/>
           </a:p>
@@ -1321,7 +1339,7 @@
           <a:p>
             <a:fld id="{84EAB7D7-3608-4730-B2E2-670834DF882C}" type="datetimeFigureOut">
               <a:rPr lang="en-US" smtClean="0"/>
-              <a:t>7/15/2015</a:t>
+              <a:t>7/16/2015</a:t>
             </a:fld>
             <a:endParaRPr lang="en-US"/>
           </a:p>
@@ -1590,7 +1608,7 @@
           <a:p>
             <a:fld id="{84EAB7D7-3608-4730-B2E2-670834DF882C}" type="datetimeFigureOut">
               <a:rPr lang="en-US" smtClean="0"/>
-              <a:t>7/15/2015</a:t>
+              <a:t>7/16/2015</a:t>
             </a:fld>
             <a:endParaRPr lang="en-US"/>
           </a:p>
@@ -1772,7 +1790,7 @@
           <a:p>
             <a:fld id="{84EAB7D7-3608-4730-B2E2-670834DF882C}" type="datetimeFigureOut">
               <a:rPr lang="en-US" smtClean="0"/>
-              <a:t>7/15/2015</a:t>
+              <a:t>7/16/2015</a:t>
             </a:fld>
             <a:endParaRPr lang="en-US"/>
           </a:p>
@@ -1976,7 +1994,7 @@
           <a:p>
             <a:fld id="{84EAB7D7-3608-4730-B2E2-670834DF882C}" type="datetimeFigureOut">
               <a:rPr lang="en-US" smtClean="0"/>
-              <a:t>7/15/2015</a:t>
+              <a:t>7/16/2015</a:t>
             </a:fld>
             <a:endParaRPr lang="en-US"/>
           </a:p>
@@ -2276,7 +2294,7 @@
           <a:p>
             <a:fld id="{84EAB7D7-3608-4730-B2E2-670834DF882C}" type="datetimeFigureOut">
               <a:rPr lang="en-US" smtClean="0"/>
-              <a:t>7/15/2015</a:t>
+              <a:t>7/16/2015</a:t>
             </a:fld>
             <a:endParaRPr lang="en-US"/>
           </a:p>
@@ -2727,7 +2745,7 @@
           <a:p>
             <a:fld id="{84EAB7D7-3608-4730-B2E2-670834DF882C}" type="datetimeFigureOut">
               <a:rPr lang="en-US" smtClean="0"/>
-              <a:t>7/15/2015</a:t>
+              <a:t>7/16/2015</a:t>
             </a:fld>
             <a:endParaRPr lang="en-US"/>
           </a:p>
@@ -2857,7 +2875,7 @@
           <a:p>
             <a:fld id="{84EAB7D7-3608-4730-B2E2-670834DF882C}" type="datetimeFigureOut">
               <a:rPr lang="en-US" smtClean="0"/>
-              <a:t>7/15/2015</a:t>
+              <a:t>7/16/2015</a:t>
             </a:fld>
             <a:endParaRPr lang="en-US"/>
           </a:p>
@@ -2964,7 +2982,7 @@
           <a:p>
             <a:fld id="{84EAB7D7-3608-4730-B2E2-670834DF882C}" type="datetimeFigureOut">
               <a:rPr lang="en-US" smtClean="0"/>
-              <a:t>7/15/2015</a:t>
+              <a:t>7/16/2015</a:t>
             </a:fld>
             <a:endParaRPr lang="en-US"/>
           </a:p>
@@ -3253,7 +3271,7 @@
           <a:p>
             <a:fld id="{84EAB7D7-3608-4730-B2E2-670834DF882C}" type="datetimeFigureOut">
               <a:rPr lang="en-US" smtClean="0"/>
-              <a:t>7/15/2015</a:t>
+              <a:t>7/16/2015</a:t>
             </a:fld>
             <a:endParaRPr lang="en-US"/>
           </a:p>
@@ -3555,7 +3573,7 @@
             <a:fld id="{84EAB7D7-3608-4730-B2E2-670834DF882C}" type="datetimeFigureOut">
               <a:rPr lang="en-US" smtClean="0"/>
               <a:pPr/>
-              <a:t>7/15/2015</a:t>
+              <a:t>7/16/2015</a:t>
             </a:fld>
             <a:endParaRPr lang="en-US"/>
           </a:p>
@@ -4405,13 +4423,13 @@
   <p:clrMapOvr>
     <a:masterClrMapping/>
   </p:clrMapOvr>
-  <mc:AlternateContent xmlns:mc="http://schemas.openxmlformats.org/markup-compatibility/2006">
-    <mc:Choice xmlns:p14="http://schemas.microsoft.com/office/powerpoint/2010/main" Requires="p14">
+  <mc:AlternateContent xmlns:mc="http://schemas.openxmlformats.org/markup-compatibility/2006" xmlns:p14="http://schemas.microsoft.com/office/powerpoint/2010/main">
+    <mc:Choice Requires="p14">
       <p:transition spd="med" p14:dur="700">
         <p:fade/>
       </p:transition>
     </mc:Choice>
-    <mc:Fallback>
+    <mc:Fallback xmlns="">
       <p:transition spd="med">
         <p:fade/>
       </p:transition>
@@ -4664,13 +4682,13 @@
   <p:clrMapOvr>
     <a:masterClrMapping/>
   </p:clrMapOvr>
-  <mc:AlternateContent xmlns:mc="http://schemas.openxmlformats.org/markup-compatibility/2006">
-    <mc:Choice xmlns:p14="http://schemas.microsoft.com/office/powerpoint/2010/main" Requires="p14">
+  <mc:AlternateContent xmlns:mc="http://schemas.openxmlformats.org/markup-compatibility/2006" xmlns:p14="http://schemas.microsoft.com/office/powerpoint/2010/main">
+    <mc:Choice Requires="p14">
       <p:transition spd="med" p14:dur="700">
         <p:fade/>
       </p:transition>
     </mc:Choice>
-    <mc:Fallback>
+    <mc:Fallback xmlns="">
       <p:transition spd="med">
         <p:fade/>
       </p:transition>
@@ -4891,13 +4909,13 @@
   <p:clrMapOvr>
     <a:masterClrMapping/>
   </p:clrMapOvr>
-  <mc:AlternateContent xmlns:mc="http://schemas.openxmlformats.org/markup-compatibility/2006">
-    <mc:Choice xmlns:p14="http://schemas.microsoft.com/office/powerpoint/2010/main" Requires="p14">
+  <mc:AlternateContent xmlns:mc="http://schemas.openxmlformats.org/markup-compatibility/2006" xmlns:p14="http://schemas.microsoft.com/office/powerpoint/2010/main">
+    <mc:Choice Requires="p14">
       <p:transition spd="med" p14:dur="700">
         <p:fade/>
       </p:transition>
     </mc:Choice>
-    <mc:Fallback>
+    <mc:Fallback xmlns="">
       <p:transition spd="med">
         <p:fade/>
       </p:transition>
@@ -5119,13 +5137,13 @@
   <p:clrMapOvr>
     <a:masterClrMapping/>
   </p:clrMapOvr>
-  <mc:AlternateContent xmlns:mc="http://schemas.openxmlformats.org/markup-compatibility/2006">
-    <mc:Choice xmlns:p14="http://schemas.microsoft.com/office/powerpoint/2010/main" Requires="p14">
+  <mc:AlternateContent xmlns:mc="http://schemas.openxmlformats.org/markup-compatibility/2006" xmlns:p14="http://schemas.microsoft.com/office/powerpoint/2010/main">
+    <mc:Choice Requires="p14">
       <p:transition spd="med" p14:dur="700">
         <p:fade/>
       </p:transition>
     </mc:Choice>
-    <mc:Fallback>
+    <mc:Fallback xmlns="">
       <p:transition spd="med">
         <p:fade/>
       </p:transition>
@@ -5309,13 +5327,13 @@
   <p:clrMapOvr>
     <a:masterClrMapping/>
   </p:clrMapOvr>
-  <mc:AlternateContent xmlns:mc="http://schemas.openxmlformats.org/markup-compatibility/2006">
-    <mc:Choice xmlns:p14="http://schemas.microsoft.com/office/powerpoint/2010/main" Requires="p14">
+  <mc:AlternateContent xmlns:mc="http://schemas.openxmlformats.org/markup-compatibility/2006" xmlns:p14="http://schemas.microsoft.com/office/powerpoint/2010/main">
+    <mc:Choice Requires="p14">
       <p:transition spd="med" p14:dur="700">
         <p:fade/>
       </p:transition>
     </mc:Choice>
-    <mc:Fallback>
+    <mc:Fallback xmlns="">
       <p:transition spd="med">
         <p:fade/>
       </p:transition>
@@ -5353,8 +5371,8 @@
         </p:nvSpPr>
         <p:spPr>
           <a:xfrm>
-            <a:off x="4267200" y="2242911"/>
-            <a:ext cx="4860471" cy="1325563"/>
+            <a:off x="3679371" y="2455182"/>
+            <a:ext cx="5676900" cy="1325563"/>
           </a:xfrm>
         </p:spPr>
         <p:txBody>
@@ -5363,7 +5381,7 @@
           <a:p>
             <a:r>
               <a:rPr lang="en-US" dirty="0" smtClean="0"/>
-              <a:t>Technologies used</a:t>
+              <a:t>Custom Load Balancer</a:t>
             </a:r>
             <a:endParaRPr lang="el-GR" dirty="0"/>
           </a:p>
@@ -5372,20 +5390,20 @@
     </p:spTree>
     <p:extLst>
       <p:ext uri="{BB962C8B-B14F-4D97-AF65-F5344CB8AC3E}">
-        <p14:creationId xmlns:p14="http://schemas.microsoft.com/office/powerpoint/2010/main" val="3089762453"/>
+        <p14:creationId xmlns:p14="http://schemas.microsoft.com/office/powerpoint/2010/main" val="3806527215"/>
       </p:ext>
     </p:extLst>
   </p:cSld>
   <p:clrMapOvr>
     <a:masterClrMapping/>
   </p:clrMapOvr>
-  <mc:AlternateContent xmlns:mc="http://schemas.openxmlformats.org/markup-compatibility/2006">
-    <mc:Choice xmlns:p14="http://schemas.microsoft.com/office/powerpoint/2010/main" Requires="p14">
+  <mc:AlternateContent xmlns:mc="http://schemas.openxmlformats.org/markup-compatibility/2006" xmlns:p14="http://schemas.microsoft.com/office/powerpoint/2010/main">
+    <mc:Choice Requires="p14">
       <p:transition spd="med" p14:dur="700">
         <p:fade/>
       </p:transition>
     </mc:Choice>
-    <mc:Fallback>
+    <mc:Fallback xmlns="">
       <p:transition spd="med">
         <p:fade/>
       </p:transition>
@@ -5423,287 +5441,100 @@
         </p:nvSpPr>
         <p:spPr>
           <a:xfrm>
-            <a:off x="1569700" y="473528"/>
-            <a:ext cx="10268514" cy="6204857"/>
+            <a:off x="1569699" y="1825625"/>
+            <a:ext cx="10007257" cy="4705804"/>
           </a:xfrm>
         </p:spPr>
         <p:txBody>
           <a:bodyPr>
-            <a:normAutofit fontScale="70000" lnSpcReduction="20000"/>
+            <a:normAutofit fontScale="92500" lnSpcReduction="10000"/>
           </a:bodyPr>
           <a:lstStyle/>
           <a:p>
             <a:r>
               <a:rPr lang="en-US" dirty="0" smtClean="0"/>
-              <a:t>Java EE</a:t>
+              <a:t>Application-level load balancer</a:t>
             </a:r>
           </a:p>
           <a:p>
             <a:pPr lvl="1"/>
             <a:r>
               <a:rPr lang="en-US" dirty="0" smtClean="0"/>
-              <a:t>JDK 1.7</a:t>
-            </a:r>
-          </a:p>
-          <a:p>
-            <a:r>
-              <a:rPr lang="en-US" dirty="0"/>
-              <a:t>Apache Tomcat 8</a:t>
+              <a:t>Could also be replicated and be accessed through a network-level load balancer</a:t>
+            </a:r>
+          </a:p>
+          <a:p>
+            <a:r>
+              <a:rPr lang="en-US" dirty="0" smtClean="0"/>
+              <a:t>HTTP request proxy</a:t>
             </a:r>
           </a:p>
           <a:p>
             <a:pPr lvl="1"/>
             <a:r>
-              <a:rPr lang="en-US" dirty="0">
-                <a:hlinkClick r:id="rId2"/>
-              </a:rPr>
-              <a:t>https://tomcat.apache.org/download-80.cgi</a:t>
-            </a:r>
-            <a:r>
-              <a:rPr lang="en-US" dirty="0"/>
-              <a:t> </a:t>
-            </a:r>
-          </a:p>
-          <a:p>
-            <a:r>
-              <a:rPr lang="en-US" dirty="0"/>
-              <a:t>Eclipse Luna</a:t>
+              <a:rPr lang="en-US" dirty="0" smtClean="0"/>
+              <a:t>Port translation from 80 and 443 to arbitrary ports</a:t>
+            </a:r>
+          </a:p>
+          <a:p>
+            <a:r>
+              <a:rPr lang="en-US" dirty="0" smtClean="0"/>
+              <a:t>Requires a specific REST service implemented on each end point</a:t>
             </a:r>
           </a:p>
           <a:p>
             <a:pPr lvl="1"/>
             <a:r>
-              <a:rPr lang="en-US" dirty="0">
-                <a:hlinkClick r:id="rId3"/>
-              </a:rPr>
-              <a:t>http://www.eclipse.org/</a:t>
-            </a:r>
-            <a:r>
-              <a:rPr lang="en-US" dirty="0"/>
-              <a:t> </a:t>
-            </a:r>
-            <a:endParaRPr lang="en-US" dirty="0" smtClean="0"/>
-          </a:p>
-          <a:p>
-            <a:r>
-              <a:rPr lang="en-US" dirty="0" smtClean="0"/>
-              <a:t>PostgreSQL</a:t>
+              <a:rPr lang="en-US" dirty="0" smtClean="0"/>
+              <a:t>Service performs work and returns the current CPU usage for the web server process</a:t>
+            </a:r>
+          </a:p>
+          <a:p>
+            <a:r>
+              <a:rPr lang="en-US" dirty="0" smtClean="0"/>
+              <a:t>Basically a MITM attacker between the client and a specific server</a:t>
             </a:r>
           </a:p>
           <a:p>
             <a:pPr lvl="1"/>
             <a:r>
               <a:rPr lang="en-US" dirty="0" smtClean="0"/>
-              <a:t>9.4, </a:t>
-            </a:r>
-            <a:r>
-              <a:rPr lang="en-US" dirty="0" err="1" smtClean="0"/>
-              <a:t>jdbc</a:t>
-            </a:r>
-            <a:r>
-              <a:rPr lang="en-US" dirty="0"/>
-              <a:t> driver, </a:t>
-            </a:r>
-            <a:r>
-              <a:rPr lang="en-US" dirty="0">
-                <a:hlinkClick r:id="rId4"/>
-              </a:rPr>
-              <a:t>http://www.postgresql.org</a:t>
-            </a:r>
-            <a:r>
-              <a:rPr lang="en-US" dirty="0" smtClean="0">
-                <a:hlinkClick r:id="rId4"/>
-              </a:rPr>
-              <a:t>/</a:t>
-            </a:r>
-            <a:r>
-              <a:rPr lang="en-US" dirty="0" smtClean="0"/>
-              <a:t> </a:t>
-            </a:r>
-          </a:p>
-          <a:p>
-            <a:r>
-              <a:rPr lang="en-US" dirty="0" smtClean="0"/>
-              <a:t>GitHub</a:t>
-            </a:r>
-          </a:p>
-          <a:p>
-            <a:pPr lvl="1"/>
-            <a:r>
-              <a:rPr lang="en-US" dirty="0" smtClean="0"/>
-              <a:t>GIT eclipse Plugin</a:t>
-            </a:r>
-          </a:p>
-          <a:p>
-            <a:pPr lvl="1"/>
-            <a:r>
-              <a:rPr lang="en-US" dirty="0" smtClean="0"/>
-              <a:t>GIT GUI	</a:t>
-            </a:r>
-          </a:p>
-          <a:p>
-            <a:r>
-              <a:rPr lang="en-US" dirty="0" smtClean="0"/>
-              <a:t>Maven </a:t>
-            </a:r>
-          </a:p>
-          <a:p>
-            <a:pPr lvl="1"/>
-            <a:r>
-              <a:rPr lang="en-US" dirty="0" smtClean="0"/>
-              <a:t>Maven eclipse plugin</a:t>
-            </a:r>
-            <a:r>
-              <a:rPr lang="en-US" dirty="0"/>
-              <a:t>, 3.2.1, </a:t>
-            </a:r>
-            <a:r>
-              <a:rPr lang="en-US" dirty="0">
-                <a:hlinkClick r:id="rId5"/>
-              </a:rPr>
-              <a:t>https://maven.apache.org</a:t>
-            </a:r>
-            <a:r>
-              <a:rPr lang="en-US" dirty="0" smtClean="0">
-                <a:hlinkClick r:id="rId5"/>
-              </a:rPr>
-              <a:t>/</a:t>
-            </a:r>
-            <a:r>
-              <a:rPr lang="en-US" dirty="0" smtClean="0"/>
-              <a:t> </a:t>
-            </a:r>
-          </a:p>
-          <a:p>
-            <a:r>
-              <a:rPr lang="en-US" dirty="0" smtClean="0"/>
-              <a:t>Spring framework</a:t>
-            </a:r>
-          </a:p>
-          <a:p>
-            <a:pPr lvl="1"/>
-            <a:r>
-              <a:rPr lang="en-US" dirty="0"/>
-              <a:t>4.1.4, </a:t>
-            </a:r>
-            <a:r>
-              <a:rPr lang="en-US" dirty="0">
-                <a:hlinkClick r:id="rId6"/>
-              </a:rPr>
-              <a:t>https://spring.io</a:t>
-            </a:r>
-            <a:r>
-              <a:rPr lang="en-US" dirty="0" smtClean="0">
-                <a:hlinkClick r:id="rId6"/>
-              </a:rPr>
-              <a:t>/</a:t>
-            </a:r>
-            <a:r>
-              <a:rPr lang="en-US" dirty="0" smtClean="0"/>
-              <a:t> </a:t>
-            </a:r>
-          </a:p>
-          <a:p>
-            <a:r>
-              <a:rPr lang="en-US" dirty="0" smtClean="0"/>
-              <a:t>Hibernate framework</a:t>
-            </a:r>
-          </a:p>
-          <a:p>
-            <a:pPr lvl="1"/>
-            <a:r>
-              <a:rPr lang="en-US" dirty="0"/>
-              <a:t>4.3.8, </a:t>
-            </a:r>
-            <a:r>
-              <a:rPr lang="en-US" dirty="0">
-                <a:hlinkClick r:id="rId7"/>
-              </a:rPr>
-              <a:t>http://hibernate.org/orm</a:t>
-            </a:r>
-            <a:r>
-              <a:rPr lang="en-US" dirty="0" smtClean="0">
-                <a:hlinkClick r:id="rId7"/>
-              </a:rPr>
-              <a:t>/</a:t>
-            </a:r>
-            <a:r>
-              <a:rPr lang="en-US" dirty="0" smtClean="0"/>
-              <a:t> </a:t>
-            </a:r>
-          </a:p>
-          <a:p>
-            <a:r>
-              <a:rPr lang="en-US" dirty="0" smtClean="0"/>
-              <a:t>Jersey (JAX-RS)</a:t>
-            </a:r>
-          </a:p>
-          <a:p>
-            <a:pPr lvl="1"/>
-            <a:r>
-              <a:rPr lang="en-US" dirty="0"/>
-              <a:t>1.18.3, </a:t>
-            </a:r>
-            <a:r>
-              <a:rPr lang="en-US" dirty="0" smtClean="0"/>
-              <a:t>JSON, </a:t>
-            </a:r>
-            <a:r>
-              <a:rPr lang="en-US" dirty="0" smtClean="0">
-                <a:hlinkClick r:id="rId8"/>
-              </a:rPr>
-              <a:t>https</a:t>
-            </a:r>
-            <a:r>
-              <a:rPr lang="en-US" dirty="0">
-                <a:hlinkClick r:id="rId8"/>
-              </a:rPr>
-              <a:t>://jersey.java.net</a:t>
-            </a:r>
-            <a:r>
-              <a:rPr lang="en-US" dirty="0" smtClean="0">
-                <a:hlinkClick r:id="rId8"/>
-              </a:rPr>
-              <a:t>/</a:t>
-            </a:r>
-            <a:r>
-              <a:rPr lang="en-US" dirty="0" smtClean="0"/>
-              <a:t> </a:t>
-            </a:r>
-          </a:p>
-          <a:p>
-            <a:r>
-              <a:rPr lang="en-US" dirty="0" smtClean="0"/>
-              <a:t>Amazon Web Services</a:t>
-            </a:r>
-          </a:p>
-          <a:p>
-            <a:pPr lvl="1"/>
-            <a:r>
-              <a:rPr lang="en-US" dirty="0"/>
-              <a:t>AWS Java JDK 1.9.22, </a:t>
-            </a:r>
-            <a:r>
-              <a:rPr lang="en-US" dirty="0">
-                <a:hlinkClick r:id="rId9"/>
-              </a:rPr>
-              <a:t>https://aws.amazon.com</a:t>
-            </a:r>
-            <a:r>
-              <a:rPr lang="en-US" dirty="0" smtClean="0">
-                <a:hlinkClick r:id="rId9"/>
-              </a:rPr>
-              <a:t>/</a:t>
-            </a:r>
-            <a:r>
-              <a:rPr lang="en-US" dirty="0" smtClean="0"/>
-              <a:t> </a:t>
-            </a:r>
-          </a:p>
-          <a:p>
-            <a:endParaRPr lang="en-US" dirty="0" smtClean="0"/>
-          </a:p>
-          <a:p>
+              <a:t>For secure connections the TLS certificate for the system is also being utilized on the balancer</a:t>
+            </a:r>
+          </a:p>
+          <a:p>
+            <a:r>
+              <a:rPr lang="en-US" dirty="0" smtClean="0"/>
+              <a:t>Ensures fault tolerance by never issuing requests on unresponsive servers</a:t>
+            </a:r>
+          </a:p>
+        </p:txBody>
+      </p:sp>
+      <p:sp>
+        <p:nvSpPr>
+          <p:cNvPr id="4" name="Title 3"/>
+          <p:cNvSpPr>
+            <a:spLocks noGrp="1"/>
+          </p:cNvSpPr>
+          <p:nvPr>
+            <p:ph type="title"/>
+          </p:nvPr>
+        </p:nvSpPr>
+        <p:spPr>
+          <a:xfrm>
+            <a:off x="1203754" y="216844"/>
+            <a:ext cx="9029700" cy="1325563"/>
+          </a:xfrm>
+        </p:spPr>
+        <p:txBody>
+          <a:bodyPr/>
+          <a:lstStyle/>
+          <a:p>
+            <a:pPr algn="ctr"/>
+            <a:r>
+              <a:rPr lang="en-US" dirty="0" smtClean="0"/>
+              <a:t>Custom Load Balancer</a:t>
+            </a:r>
             <a:endParaRPr lang="el-GR" dirty="0"/>
           </a:p>
         </p:txBody>
@@ -5711,25 +5542,32 @@
     </p:spTree>
     <p:extLst>
       <p:ext uri="{BB962C8B-B14F-4D97-AF65-F5344CB8AC3E}">
-        <p14:creationId xmlns:p14="http://schemas.microsoft.com/office/powerpoint/2010/main" val="3755753112"/>
+        <p14:creationId xmlns:p14="http://schemas.microsoft.com/office/powerpoint/2010/main" val="121429515"/>
       </p:ext>
     </p:extLst>
   </p:cSld>
   <p:clrMapOvr>
     <a:masterClrMapping/>
   </p:clrMapOvr>
-  <mc:AlternateContent xmlns:mc="http://schemas.openxmlformats.org/markup-compatibility/2006">
-    <mc:Choice xmlns:p14="http://schemas.microsoft.com/office/powerpoint/2010/main" Requires="p14">
+  <mc:AlternateContent xmlns:mc="http://schemas.openxmlformats.org/markup-compatibility/2006" xmlns:p14="http://schemas.microsoft.com/office/powerpoint/2010/main">
+    <mc:Choice Requires="p14">
       <p:transition spd="med" p14:dur="700">
         <p:fade/>
       </p:transition>
     </mc:Choice>
-    <mc:Fallback>
+    <mc:Fallback xmlns="">
       <p:transition spd="med">
         <p:fade/>
       </p:transition>
     </mc:Fallback>
   </mc:AlternateContent>
+  <p:timing>
+    <p:tnLst>
+      <p:par>
+        <p:cTn id="1" dur="indefinite" restart="never" nodeType="tmRoot"/>
+      </p:par>
+    </p:tnLst>
+  </p:timing>
 </p:sld>
 </file>
 
@@ -5750,252 +5588,47 @@
           <a:chExt cx="0" cy="0"/>
         </a:xfrm>
       </p:grpSpPr>
-      <p:sp>
-        <p:nvSpPr>
-          <p:cNvPr id="3" name="Content Placeholder 2"/>
-          <p:cNvSpPr>
-            <a:spLocks noGrp="1"/>
-          </p:cNvSpPr>
-          <p:nvPr>
-            <p:ph sz="half" idx="1"/>
-          </p:nvPr>
-        </p:nvSpPr>
+      <p:pic>
+        <p:nvPicPr>
+          <p:cNvPr id="2" name="Picture 1"/>
+          <p:cNvPicPr>
+            <a:picLocks noChangeAspect="1"/>
+          </p:cNvPicPr>
+          <p:nvPr/>
+        </p:nvPicPr>
+        <p:blipFill>
+          <a:blip r:embed="rId2"/>
+          <a:stretch>
+            <a:fillRect/>
+          </a:stretch>
+        </p:blipFill>
         <p:spPr>
           <a:xfrm>
-            <a:off x="1667671" y="293914"/>
-            <a:ext cx="10235857" cy="6564086"/>
+            <a:off x="3459251" y="200888"/>
+            <a:ext cx="5273497" cy="6456224"/>
           </a:xfrm>
+          <a:prstGeom prst="rect">
+            <a:avLst/>
+          </a:prstGeom>
         </p:spPr>
-        <p:txBody>
-          <a:bodyPr>
-            <a:normAutofit fontScale="92500" lnSpcReduction="10000"/>
-          </a:bodyPr>
-          <a:lstStyle/>
-          <a:p>
-            <a:r>
-              <a:rPr lang="en-US" dirty="0" err="1" smtClean="0"/>
-              <a:t>Jasypt</a:t>
-            </a:r>
-            <a:endParaRPr lang="en-US" dirty="0" smtClean="0"/>
-          </a:p>
-          <a:p>
-            <a:pPr lvl="1"/>
-            <a:r>
-              <a:rPr lang="en-US" dirty="0" smtClean="0"/>
-              <a:t>1.9.2</a:t>
-            </a:r>
-            <a:r>
-              <a:rPr lang="en-US" dirty="0"/>
-              <a:t>, Encryption, </a:t>
-            </a:r>
-            <a:r>
-              <a:rPr lang="en-US" dirty="0">
-                <a:hlinkClick r:id="rId2"/>
-              </a:rPr>
-              <a:t>http://www.jasypt.org</a:t>
-            </a:r>
-            <a:r>
-              <a:rPr lang="en-US" dirty="0" smtClean="0">
-                <a:hlinkClick r:id="rId2"/>
-              </a:rPr>
-              <a:t>/</a:t>
-            </a:r>
-            <a:r>
-              <a:rPr lang="en-US" dirty="0" smtClean="0"/>
-              <a:t> </a:t>
-            </a:r>
-          </a:p>
-          <a:p>
-            <a:r>
-              <a:rPr lang="en-US" dirty="0" err="1" smtClean="0"/>
-              <a:t>Joda</a:t>
-            </a:r>
-            <a:endParaRPr lang="en-US" dirty="0" smtClean="0"/>
-          </a:p>
-          <a:p>
-            <a:pPr lvl="1"/>
-            <a:r>
-              <a:rPr lang="en-US" dirty="0" smtClean="0"/>
-              <a:t>2.7, </a:t>
-            </a:r>
-            <a:r>
-              <a:rPr lang="en-US" dirty="0" err="1" smtClean="0"/>
-              <a:t>DateTime</a:t>
-            </a:r>
-            <a:r>
-              <a:rPr lang="en-US" dirty="0"/>
-              <a:t> library, </a:t>
-            </a:r>
-            <a:r>
-              <a:rPr lang="en-US" dirty="0">
-                <a:hlinkClick r:id="rId3"/>
-              </a:rPr>
-              <a:t>http://www.joda.org/joda-time</a:t>
-            </a:r>
-            <a:r>
-              <a:rPr lang="en-US" dirty="0" smtClean="0">
-                <a:hlinkClick r:id="rId3"/>
-              </a:rPr>
-              <a:t>/</a:t>
-            </a:r>
-            <a:r>
-              <a:rPr lang="en-US" dirty="0" smtClean="0"/>
-              <a:t> </a:t>
-            </a:r>
-          </a:p>
-          <a:p>
-            <a:r>
-              <a:rPr lang="en-US" dirty="0" smtClean="0"/>
-              <a:t>Junit</a:t>
-            </a:r>
-          </a:p>
-          <a:p>
-            <a:pPr lvl="1"/>
-            <a:r>
-              <a:rPr lang="en-US" dirty="0"/>
-              <a:t>4.12, </a:t>
-            </a:r>
-            <a:r>
-              <a:rPr lang="en-US" dirty="0">
-                <a:hlinkClick r:id="rId4"/>
-              </a:rPr>
-              <a:t>http://junit.org</a:t>
-            </a:r>
-            <a:r>
-              <a:rPr lang="en-US" dirty="0" smtClean="0">
-                <a:hlinkClick r:id="rId4"/>
-              </a:rPr>
-              <a:t>/</a:t>
-            </a:r>
-            <a:r>
-              <a:rPr lang="en-US" dirty="0" smtClean="0"/>
-              <a:t> </a:t>
-            </a:r>
-          </a:p>
-          <a:p>
-            <a:r>
-              <a:rPr lang="en-US" dirty="0" smtClean="0"/>
-              <a:t>Log4J</a:t>
-            </a:r>
-          </a:p>
-          <a:p>
-            <a:pPr lvl="1"/>
-            <a:r>
-              <a:rPr lang="en-US" dirty="0" smtClean="0"/>
-              <a:t>1.2.17</a:t>
-            </a:r>
-            <a:r>
-              <a:rPr lang="en-US" dirty="0"/>
-              <a:t>, </a:t>
-            </a:r>
-            <a:r>
-              <a:rPr lang="en-US" dirty="0">
-                <a:hlinkClick r:id="rId5"/>
-              </a:rPr>
-              <a:t>http://logging.apache.org/log4j/2.x</a:t>
-            </a:r>
-            <a:r>
-              <a:rPr lang="en-US" dirty="0" smtClean="0">
-                <a:hlinkClick r:id="rId5"/>
-              </a:rPr>
-              <a:t>/</a:t>
-            </a:r>
-            <a:r>
-              <a:rPr lang="en-US" dirty="0" smtClean="0"/>
-              <a:t> </a:t>
-            </a:r>
-          </a:p>
-          <a:p>
-            <a:r>
-              <a:rPr lang="en-US" dirty="0" smtClean="0"/>
-              <a:t>Android Studio</a:t>
-            </a:r>
-          </a:p>
-          <a:p>
-            <a:pPr lvl="1"/>
-            <a:r>
-              <a:rPr lang="en-US" dirty="0"/>
-              <a:t>1.2, </a:t>
-            </a:r>
-            <a:r>
-              <a:rPr lang="en-US" dirty="0">
-                <a:hlinkClick r:id="rId6"/>
-              </a:rPr>
-              <a:t>http://</a:t>
-            </a:r>
-            <a:r>
-              <a:rPr lang="en-US" dirty="0" smtClean="0">
-                <a:hlinkClick r:id="rId6"/>
-              </a:rPr>
-              <a:t>developer.android.com/tools/studio/index.html</a:t>
-            </a:r>
-            <a:r>
-              <a:rPr lang="en-US" dirty="0" smtClean="0"/>
-              <a:t> </a:t>
-            </a:r>
-          </a:p>
-          <a:p>
-            <a:r>
-              <a:rPr lang="en-US" dirty="0" smtClean="0"/>
-              <a:t>Volley</a:t>
-            </a:r>
-          </a:p>
-          <a:p>
-            <a:r>
-              <a:rPr lang="en-US" dirty="0" err="1" smtClean="0"/>
-              <a:t>Gson</a:t>
-            </a:r>
-            <a:endParaRPr lang="en-US" dirty="0" smtClean="0"/>
-          </a:p>
-          <a:p>
-            <a:pPr lvl="1"/>
-            <a:r>
-              <a:rPr lang="en-US" dirty="0" smtClean="0"/>
-              <a:t>2.3.1</a:t>
-            </a:r>
-          </a:p>
-          <a:p>
-            <a:r>
-              <a:rPr lang="en-US" dirty="0" err="1" smtClean="0"/>
-              <a:t>MPAndroidChart</a:t>
-            </a:r>
-            <a:endParaRPr lang="en-US" dirty="0" smtClean="0"/>
-          </a:p>
-          <a:p>
-            <a:pPr lvl="1"/>
-            <a:r>
-              <a:rPr lang="en-US" dirty="0" smtClean="0"/>
-              <a:t>2.0.9</a:t>
-            </a:r>
-          </a:p>
-          <a:p>
-            <a:r>
-              <a:rPr lang="en-US" dirty="0" smtClean="0"/>
-              <a:t>Android API 21</a:t>
-            </a:r>
-          </a:p>
-          <a:p>
-            <a:endParaRPr lang="el-GR" dirty="0"/>
-          </a:p>
-        </p:txBody>
-      </p:sp>
+      </p:pic>
     </p:spTree>
     <p:extLst>
       <p:ext uri="{BB962C8B-B14F-4D97-AF65-F5344CB8AC3E}">
-        <p14:creationId xmlns:p14="http://schemas.microsoft.com/office/powerpoint/2010/main" val="587725017"/>
+        <p14:creationId xmlns:p14="http://schemas.microsoft.com/office/powerpoint/2010/main" val="1734639870"/>
       </p:ext>
     </p:extLst>
   </p:cSld>
   <p:clrMapOvr>
     <a:masterClrMapping/>
   </p:clrMapOvr>
-  <mc:AlternateContent xmlns:mc="http://schemas.openxmlformats.org/markup-compatibility/2006">
-    <mc:Choice xmlns:p14="http://schemas.microsoft.com/office/powerpoint/2010/main" Requires="p14">
+  <mc:AlternateContent xmlns:mc="http://schemas.openxmlformats.org/markup-compatibility/2006" xmlns:p14="http://schemas.microsoft.com/office/powerpoint/2010/main">
+    <mc:Choice Requires="p14">
       <p:transition spd="med" p14:dur="700">
         <p:fade/>
       </p:transition>
     </mc:Choice>
-    <mc:Fallback>
+    <mc:Fallback xmlns="">
       <p:transition spd="med">
         <p:fade/>
       </p:transition>
@@ -6023,17 +5656,112 @@
       </p:grpSpPr>
       <p:sp>
         <p:nvSpPr>
-          <p:cNvPr id="4" name="Title 3"/>
-          <p:cNvSpPr>
-            <a:spLocks noGrp="1"/>
-          </p:cNvSpPr>
-          <p:nvPr>
-            <p:ph type="title"/>
+          <p:cNvPr id="3" name="Content Placeholder 2"/>
+          <p:cNvSpPr>
+            <a:spLocks noGrp="1"/>
+          </p:cNvSpPr>
+          <p:nvPr>
+            <p:ph sz="half" idx="1"/>
           </p:nvPr>
         </p:nvSpPr>
         <p:spPr>
           <a:xfrm>
-            <a:off x="2471057" y="2683782"/>
+            <a:off x="1569699" y="1825625"/>
+            <a:ext cx="10007257" cy="4705804"/>
+          </a:xfrm>
+        </p:spPr>
+        <p:txBody>
+          <a:bodyPr>
+            <a:normAutofit fontScale="85000" lnSpcReduction="10000"/>
+          </a:bodyPr>
+          <a:lstStyle/>
+          <a:p>
+            <a:r>
+              <a:rPr lang="en-US" dirty="0" smtClean="0"/>
+              <a:t>Server Rank</a:t>
+            </a:r>
+          </a:p>
+          <a:p>
+            <a:pPr lvl="1"/>
+            <a:r>
+              <a:rPr lang="en-US" dirty="0" smtClean="0"/>
+              <a:t>Takes into account the CPU usage and request latency.</a:t>
+            </a:r>
+          </a:p>
+          <a:p>
+            <a:pPr lvl="1"/>
+            <a:r>
+              <a:rPr lang="en-US" dirty="0" smtClean="0"/>
+              <a:t>Represents the server congestion, the time it takes to serve a request and the network latency compressed in a single scalar value.</a:t>
+            </a:r>
+          </a:p>
+          <a:p>
+            <a:pPr lvl="1"/>
+            <a:r>
+              <a:rPr lang="en-US" dirty="0" smtClean="0"/>
+              <a:t>If a server is unreachable, it receives an exceedingly large rank of 10000 (OVER 9000!)</a:t>
+            </a:r>
+          </a:p>
+          <a:p>
+            <a:r>
+              <a:rPr lang="en-US" dirty="0" smtClean="0"/>
+              <a:t>Server selection</a:t>
+            </a:r>
+          </a:p>
+          <a:p>
+            <a:pPr lvl="1"/>
+            <a:r>
+              <a:rPr lang="en-US" dirty="0"/>
+              <a:t>The load balancer frequently queries all the servers using the status service to refresh their ranks</a:t>
+            </a:r>
+          </a:p>
+          <a:p>
+            <a:pPr lvl="1"/>
+            <a:r>
+              <a:rPr lang="en-US" dirty="0"/>
+              <a:t>Every time a request is being delegated to a server, the server’s rank </a:t>
+            </a:r>
+            <a:r>
+              <a:rPr lang="en-US" dirty="0" smtClean="0"/>
+              <a:t>increases</a:t>
+            </a:r>
+          </a:p>
+          <a:p>
+            <a:pPr lvl="1"/>
+            <a:r>
+              <a:rPr lang="en-US" dirty="0" smtClean="0"/>
+              <a:t>The server with the lowest rank will be selected</a:t>
+            </a:r>
+          </a:p>
+          <a:p>
+            <a:pPr lvl="1"/>
+            <a:r>
+              <a:rPr lang="en-US" dirty="0" smtClean="0"/>
+              <a:t>If servers are relatively equal in rank, the requests will be evenly distributed, while if a server has a significantly lower rank than the others it will be preferred constantly</a:t>
+            </a:r>
+          </a:p>
+          <a:p>
+            <a:pPr lvl="1"/>
+            <a:r>
+              <a:rPr lang="en-US" dirty="0" smtClean="0"/>
+              <a:t>Overall, the algorithm tends to distribute the load and in the same time optimize the request latency</a:t>
+            </a:r>
+          </a:p>
+        </p:txBody>
+      </p:sp>
+      <p:sp>
+        <p:nvSpPr>
+          <p:cNvPr id="4" name="Title 3"/>
+          <p:cNvSpPr>
+            <a:spLocks noGrp="1"/>
+          </p:cNvSpPr>
+          <p:nvPr>
+            <p:ph type="title"/>
+          </p:nvPr>
+        </p:nvSpPr>
+        <p:spPr>
+          <a:xfrm>
+            <a:off x="1203754" y="216844"/>
             <a:ext cx="9029700" cy="1325563"/>
           </a:xfrm>
         </p:spPr>
@@ -6044,7 +5772,7 @@
             <a:pPr algn="ctr"/>
             <a:r>
               <a:rPr lang="en-US" dirty="0" smtClean="0"/>
-              <a:t>Subjects covered</a:t>
+              <a:t>Custom Load Balancer</a:t>
             </a:r>
             <a:endParaRPr lang="el-GR" dirty="0"/>
           </a:p>
@@ -6053,25 +5781,32 @@
     </p:spTree>
     <p:extLst>
       <p:ext uri="{BB962C8B-B14F-4D97-AF65-F5344CB8AC3E}">
-        <p14:creationId xmlns:p14="http://schemas.microsoft.com/office/powerpoint/2010/main" val="177934842"/>
+        <p14:creationId xmlns:p14="http://schemas.microsoft.com/office/powerpoint/2010/main" val="2332665236"/>
       </p:ext>
     </p:extLst>
   </p:cSld>
   <p:clrMapOvr>
     <a:masterClrMapping/>
   </p:clrMapOvr>
-  <mc:AlternateContent xmlns:mc="http://schemas.openxmlformats.org/markup-compatibility/2006">
-    <mc:Choice xmlns:p14="http://schemas.microsoft.com/office/powerpoint/2010/main" Requires="p14">
+  <mc:AlternateContent xmlns:mc="http://schemas.openxmlformats.org/markup-compatibility/2006" xmlns:p14="http://schemas.microsoft.com/office/powerpoint/2010/main">
+    <mc:Choice Requires="p14">
       <p:transition spd="med" p14:dur="700">
         <p:fade/>
       </p:transition>
     </mc:Choice>
-    <mc:Fallback>
+    <mc:Fallback xmlns="">
       <p:transition spd="med">
         <p:fade/>
       </p:transition>
     </mc:Fallback>
   </mc:AlternateContent>
+  <p:timing>
+    <p:tnLst>
+      <p:par>
+        <p:cTn id="1" dur="indefinite" restart="never" nodeType="tmRoot"/>
+      </p:par>
+    </p:tnLst>
+  </p:timing>
 </p:sld>
 </file>
 
@@ -6130,13 +5865,13 @@
   <p:clrMapOvr>
     <a:masterClrMapping/>
   </p:clrMapOvr>
-  <mc:AlternateContent xmlns:mc="http://schemas.openxmlformats.org/markup-compatibility/2006">
-    <mc:Choice xmlns:p14="http://schemas.microsoft.com/office/powerpoint/2010/main" Requires="p14">
+  <mc:AlternateContent xmlns:mc="http://schemas.openxmlformats.org/markup-compatibility/2006" xmlns:p14="http://schemas.microsoft.com/office/powerpoint/2010/main">
+    <mc:Choice Requires="p14">
       <p:transition spd="med" p14:dur="700">
         <p:fade/>
       </p:transition>
     </mc:Choice>
-    <mc:Fallback>
+    <mc:Fallback xmlns="">
       <p:transition spd="med">
         <p:fade/>
       </p:transition>
@@ -6162,181 +5897,47 @@
           <a:chExt cx="0" cy="0"/>
         </a:xfrm>
       </p:grpSpPr>
-      <p:sp>
-        <p:nvSpPr>
-          <p:cNvPr id="3" name="Content Placeholder 2"/>
-          <p:cNvSpPr>
-            <a:spLocks noGrp="1"/>
-          </p:cNvSpPr>
-          <p:nvPr>
-            <p:ph sz="half" idx="1"/>
-          </p:nvPr>
-        </p:nvSpPr>
+      <p:pic>
+        <p:nvPicPr>
+          <p:cNvPr id="5" name="Picture 4"/>
+          <p:cNvPicPr>
+            <a:picLocks noChangeAspect="1"/>
+          </p:cNvPicPr>
+          <p:nvPr/>
+        </p:nvPicPr>
+        <p:blipFill>
+          <a:blip r:embed="rId2"/>
+          <a:stretch>
+            <a:fillRect/>
+          </a:stretch>
+        </p:blipFill>
         <p:spPr>
           <a:xfrm>
-            <a:off x="1126671" y="408214"/>
-            <a:ext cx="10662557" cy="6188529"/>
+            <a:off x="1147762" y="914400"/>
+            <a:ext cx="9896475" cy="5029200"/>
           </a:xfrm>
+          <a:prstGeom prst="rect">
+            <a:avLst/>
+          </a:prstGeom>
         </p:spPr>
-        <p:txBody>
-          <a:bodyPr>
-            <a:normAutofit lnSpcReduction="10000"/>
-          </a:bodyPr>
-          <a:lstStyle/>
-          <a:p>
-            <a:r>
-              <a:rPr lang="en-US" dirty="0" smtClean="0"/>
-              <a:t>Performance / Scalability</a:t>
-            </a:r>
-          </a:p>
-          <a:p>
-            <a:pPr lvl="1"/>
-            <a:r>
-              <a:rPr lang="en-US" dirty="0" smtClean="0"/>
-              <a:t>Cluster of servers (EC2)</a:t>
-            </a:r>
-          </a:p>
-          <a:p>
-            <a:pPr lvl="1"/>
-            <a:r>
-              <a:rPr lang="en-US" dirty="0" smtClean="0"/>
-              <a:t>Load Balancer (ELB)</a:t>
-            </a:r>
-          </a:p>
-          <a:p>
-            <a:pPr lvl="2"/>
-            <a:r>
-              <a:rPr lang="en-US" dirty="0" smtClean="0"/>
-              <a:t>Single point of failure</a:t>
-            </a:r>
-          </a:p>
-          <a:p>
-            <a:pPr lvl="1"/>
-            <a:r>
-              <a:rPr lang="en-US" dirty="0" smtClean="0"/>
-              <a:t>Cluster of databases (RDS)</a:t>
-            </a:r>
-          </a:p>
-          <a:p>
-            <a:pPr lvl="1"/>
-            <a:r>
-              <a:rPr lang="en-US" dirty="0" smtClean="0"/>
-              <a:t>Scalable Storage Server (S3)</a:t>
-            </a:r>
-          </a:p>
-          <a:p>
-            <a:pPr lvl="1"/>
-            <a:r>
-              <a:rPr lang="en-US" dirty="0" smtClean="0"/>
-              <a:t>REST Services</a:t>
-            </a:r>
-          </a:p>
-          <a:p>
-            <a:r>
-              <a:rPr lang="en-US" dirty="0" smtClean="0"/>
-              <a:t>Replication</a:t>
-            </a:r>
-          </a:p>
-          <a:p>
-            <a:pPr lvl="1"/>
-            <a:r>
-              <a:rPr lang="en-US" dirty="0" smtClean="0"/>
-              <a:t>Database replication (Read Replicas)</a:t>
-            </a:r>
-          </a:p>
-          <a:p>
-            <a:r>
-              <a:rPr lang="en-US" dirty="0" smtClean="0"/>
-              <a:t>Naming</a:t>
-            </a:r>
-          </a:p>
-          <a:p>
-            <a:pPr lvl="1"/>
-            <a:r>
-              <a:rPr lang="en-US" dirty="0" smtClean="0"/>
-              <a:t>We found available </a:t>
-            </a:r>
-            <a:r>
-              <a:rPr lang="en-US" dirty="0"/>
-              <a:t>domain names at </a:t>
-            </a:r>
-            <a:r>
-              <a:rPr lang="en-US" dirty="0" smtClean="0">
-                <a:hlinkClick r:id="rId2"/>
-              </a:rPr>
-              <a:t>https</a:t>
-            </a:r>
-            <a:r>
-              <a:rPr lang="en-US" dirty="0">
-                <a:hlinkClick r:id="rId2"/>
-              </a:rPr>
-              <a:t>://uniregistry.com</a:t>
-            </a:r>
-            <a:r>
-              <a:rPr lang="en-US" dirty="0" smtClean="0">
-                <a:hlinkClick r:id="rId2"/>
-              </a:rPr>
-              <a:t>/</a:t>
-            </a:r>
-            <a:r>
-              <a:rPr lang="en-US" dirty="0" smtClean="0"/>
-              <a:t> (</a:t>
-            </a:r>
-            <a:r>
-              <a:rPr lang="en-US" dirty="0" err="1" smtClean="0"/>
-              <a:t>voteforit.click</a:t>
-            </a:r>
-            <a:r>
-              <a:rPr lang="en-US" dirty="0"/>
-              <a:t> – 1USD), and at </a:t>
-            </a:r>
-            <a:r>
-              <a:rPr lang="en-US" dirty="0">
-                <a:hlinkClick r:id="rId3"/>
-              </a:rPr>
-              <a:t>https://www.papaki.gr</a:t>
-            </a:r>
-            <a:r>
-              <a:rPr lang="en-US" dirty="0" smtClean="0">
-                <a:hlinkClick r:id="rId3"/>
-              </a:rPr>
-              <a:t>/</a:t>
-            </a:r>
-            <a:r>
-              <a:rPr lang="en-US" dirty="0" smtClean="0"/>
-              <a:t> (vote4it.eu – 3 Euros) but we could not purchase it due to Capital Control :P</a:t>
-            </a:r>
-          </a:p>
-          <a:p>
-            <a:pPr lvl="1"/>
-            <a:r>
-              <a:rPr lang="en-US" dirty="0" smtClean="0"/>
-              <a:t>If we had purchased those domain names we would use Amazons’ DNS Servers to translate this domain name to the IP address of our Load Balancer </a:t>
-            </a:r>
-          </a:p>
-          <a:p>
-            <a:pPr lvl="1"/>
-            <a:endParaRPr lang="el-GR" dirty="0"/>
-          </a:p>
-        </p:txBody>
-      </p:sp>
+      </p:pic>
     </p:spTree>
     <p:extLst>
       <p:ext uri="{BB962C8B-B14F-4D97-AF65-F5344CB8AC3E}">
-        <p14:creationId xmlns:p14="http://schemas.microsoft.com/office/powerpoint/2010/main" val="1835869883"/>
+        <p14:creationId xmlns:p14="http://schemas.microsoft.com/office/powerpoint/2010/main" val="2107876446"/>
       </p:ext>
     </p:extLst>
   </p:cSld>
   <p:clrMapOvr>
     <a:masterClrMapping/>
   </p:clrMapOvr>
-  <mc:AlternateContent xmlns:mc="http://schemas.openxmlformats.org/markup-compatibility/2006">
-    <mc:Choice xmlns:p14="http://schemas.microsoft.com/office/powerpoint/2010/main" Requires="p14">
+  <mc:AlternateContent xmlns:mc="http://schemas.openxmlformats.org/markup-compatibility/2006" xmlns:p14="http://schemas.microsoft.com/office/powerpoint/2010/main">
+    <mc:Choice Requires="p14">
       <p:transition spd="med" p14:dur="700">
         <p:fade/>
       </p:transition>
     </mc:Choice>
-    <mc:Fallback>
+    <mc:Fallback xmlns="">
       <p:transition spd="med">
         <p:fade/>
       </p:transition>
@@ -6362,163 +5963,47 @@
           <a:chExt cx="0" cy="0"/>
         </a:xfrm>
       </p:grpSpPr>
-      <p:sp>
-        <p:nvSpPr>
-          <p:cNvPr id="3" name="Content Placeholder 2"/>
-          <p:cNvSpPr>
-            <a:spLocks noGrp="1"/>
-          </p:cNvSpPr>
-          <p:nvPr>
-            <p:ph sz="half" idx="1"/>
-          </p:nvPr>
-        </p:nvSpPr>
+      <p:pic>
+        <p:nvPicPr>
+          <p:cNvPr id="5" name="Picture 4"/>
+          <p:cNvPicPr>
+            <a:picLocks noChangeAspect="1"/>
+          </p:cNvPicPr>
+          <p:nvPr/>
+        </p:nvPicPr>
+        <p:blipFill>
+          <a:blip r:embed="rId2"/>
+          <a:stretch>
+            <a:fillRect/>
+          </a:stretch>
+        </p:blipFill>
         <p:spPr>
           <a:xfrm>
-            <a:off x="1112499" y="1028700"/>
-            <a:ext cx="10219529" cy="5568044"/>
+            <a:off x="1114425" y="828675"/>
+            <a:ext cx="9963150" cy="5200650"/>
           </a:xfrm>
+          <a:prstGeom prst="rect">
+            <a:avLst/>
+          </a:prstGeom>
         </p:spPr>
-        <p:txBody>
-          <a:bodyPr>
-            <a:normAutofit fontScale="92500" lnSpcReduction="20000"/>
-          </a:bodyPr>
-          <a:lstStyle/>
-          <a:p>
-            <a:r>
-              <a:rPr lang="en-US" dirty="0"/>
-              <a:t> Fault Tolerance</a:t>
-            </a:r>
-          </a:p>
-          <a:p>
-            <a:pPr lvl="1"/>
-            <a:r>
-              <a:rPr lang="en-US" dirty="0" smtClean="0"/>
-              <a:t>Automated database backups</a:t>
-            </a:r>
-          </a:p>
-          <a:p>
-            <a:pPr lvl="1"/>
-            <a:r>
-              <a:rPr lang="en-US" dirty="0" smtClean="0"/>
-              <a:t>If primary database fails read replica becomes primary</a:t>
-            </a:r>
-          </a:p>
-          <a:p>
-            <a:pPr lvl="1"/>
-            <a:r>
-              <a:rPr lang="en-US" dirty="0" smtClean="0"/>
-              <a:t>If one server fails the others can share the load until another server becomes active</a:t>
-            </a:r>
-          </a:p>
-          <a:p>
-            <a:r>
-              <a:rPr lang="en-US" dirty="0" smtClean="0"/>
-              <a:t>Communication</a:t>
-            </a:r>
-          </a:p>
-          <a:p>
-            <a:pPr lvl="1"/>
-            <a:r>
-              <a:rPr lang="en-US" dirty="0" smtClean="0"/>
-              <a:t>REST Services - Stateless</a:t>
-            </a:r>
-          </a:p>
-          <a:p>
-            <a:pPr lvl="1"/>
-            <a:r>
-              <a:rPr lang="en-US" dirty="0" smtClean="0"/>
-              <a:t>HTTP / HTTPS Messages</a:t>
-            </a:r>
-          </a:p>
-          <a:p>
-            <a:pPr lvl="1"/>
-            <a:r>
-              <a:rPr lang="en-US" dirty="0" smtClean="0"/>
-              <a:t>JSON</a:t>
-            </a:r>
-          </a:p>
-          <a:p>
-            <a:pPr lvl="1"/>
-            <a:r>
-              <a:rPr lang="en-US" dirty="0" smtClean="0"/>
-              <a:t>Session-token user authentication</a:t>
-            </a:r>
-          </a:p>
-          <a:p>
-            <a:r>
-              <a:rPr lang="en-US" dirty="0" smtClean="0"/>
-              <a:t>Security</a:t>
-            </a:r>
-          </a:p>
-          <a:p>
-            <a:pPr lvl="1"/>
-            <a:r>
-              <a:rPr lang="en-US" dirty="0" smtClean="0"/>
-              <a:t>SSL (prevent MITM attacks), Self Signed Certificates, .</a:t>
-            </a:r>
-            <a:r>
-              <a:rPr lang="en-US" dirty="0" err="1" smtClean="0"/>
-              <a:t>keystore</a:t>
-            </a:r>
-            <a:r>
-              <a:rPr lang="en-US" dirty="0" smtClean="0"/>
-              <a:t> for tomcat</a:t>
-            </a:r>
-          </a:p>
-          <a:p>
-            <a:pPr lvl="1"/>
-            <a:r>
-              <a:rPr lang="en-US" dirty="0" smtClean="0"/>
-              <a:t>Salt hashing of passwords (prevent rainbow attacks)</a:t>
-            </a:r>
-          </a:p>
-          <a:p>
-            <a:pPr lvl="1"/>
-            <a:r>
-              <a:rPr lang="en-US" dirty="0" smtClean="0"/>
-              <a:t>Advanced Encryption functions</a:t>
-            </a:r>
-          </a:p>
-          <a:p>
-            <a:pPr lvl="1"/>
-            <a:r>
-              <a:rPr lang="en-US" dirty="0" smtClean="0"/>
-              <a:t>Amazon Security Groups (prevent unauthorized access to our instances)</a:t>
-            </a:r>
-          </a:p>
-          <a:p>
-            <a:pPr lvl="1"/>
-            <a:r>
-              <a:rPr lang="en-US" dirty="0" smtClean="0"/>
-              <a:t>IAM (user authentication and access privileges to AWS resources)</a:t>
-            </a:r>
-          </a:p>
-          <a:p>
-            <a:endParaRPr lang="en-US" dirty="0" smtClean="0"/>
-          </a:p>
-          <a:p>
-            <a:pPr lvl="1"/>
-            <a:endParaRPr lang="el-GR" dirty="0"/>
-          </a:p>
-        </p:txBody>
-      </p:sp>
+      </p:pic>
     </p:spTree>
     <p:extLst>
       <p:ext uri="{BB962C8B-B14F-4D97-AF65-F5344CB8AC3E}">
-        <p14:creationId xmlns:p14="http://schemas.microsoft.com/office/powerpoint/2010/main" val="900635408"/>
+        <p14:creationId xmlns:p14="http://schemas.microsoft.com/office/powerpoint/2010/main" val="3993550227"/>
       </p:ext>
     </p:extLst>
   </p:cSld>
   <p:clrMapOvr>
     <a:masterClrMapping/>
   </p:clrMapOvr>
-  <mc:AlternateContent xmlns:mc="http://schemas.openxmlformats.org/markup-compatibility/2006">
-    <mc:Choice xmlns:p14="http://schemas.microsoft.com/office/powerpoint/2010/main" Requires="p14">
+  <mc:AlternateContent xmlns:mc="http://schemas.openxmlformats.org/markup-compatibility/2006" xmlns:p14="http://schemas.microsoft.com/office/powerpoint/2010/main">
+    <mc:Choice Requires="p14">
       <p:transition spd="med" p14:dur="700">
         <p:fade/>
       </p:transition>
     </mc:Choice>
-    <mc:Fallback>
+    <mc:Fallback xmlns="">
       <p:transition spd="med">
         <p:fade/>
       </p:transition>
@@ -6544,51 +6029,47 @@
           <a:chExt cx="0" cy="0"/>
         </a:xfrm>
       </p:grpSpPr>
-      <p:sp>
-        <p:nvSpPr>
-          <p:cNvPr id="4" name="Title 3"/>
-          <p:cNvSpPr>
-            <a:spLocks noGrp="1"/>
-          </p:cNvSpPr>
-          <p:nvPr>
-            <p:ph type="title"/>
-          </p:nvPr>
-        </p:nvSpPr>
+      <p:pic>
+        <p:nvPicPr>
+          <p:cNvPr id="5" name="Picture 4"/>
+          <p:cNvPicPr>
+            <a:picLocks noChangeAspect="1"/>
+          </p:cNvPicPr>
+          <p:nvPr/>
+        </p:nvPicPr>
+        <p:blipFill>
+          <a:blip r:embed="rId2"/>
+          <a:stretch>
+            <a:fillRect/>
+          </a:stretch>
+        </p:blipFill>
         <p:spPr>
           <a:xfrm>
-            <a:off x="3679371" y="2455182"/>
-            <a:ext cx="5676900" cy="1325563"/>
+            <a:off x="1133475" y="819150"/>
+            <a:ext cx="9925050" cy="5219700"/>
           </a:xfrm>
+          <a:prstGeom prst="rect">
+            <a:avLst/>
+          </a:prstGeom>
         </p:spPr>
-        <p:txBody>
-          <a:bodyPr/>
-          <a:lstStyle/>
-          <a:p>
-            <a:r>
-              <a:rPr lang="en-US" dirty="0" smtClean="0"/>
-              <a:t>Custom Load Balancer</a:t>
-            </a:r>
-            <a:endParaRPr lang="el-GR" dirty="0"/>
-          </a:p>
-        </p:txBody>
-      </p:sp>
+      </p:pic>
     </p:spTree>
     <p:extLst>
       <p:ext uri="{BB962C8B-B14F-4D97-AF65-F5344CB8AC3E}">
-        <p14:creationId xmlns:p14="http://schemas.microsoft.com/office/powerpoint/2010/main" val="3806527215"/>
+        <p14:creationId xmlns:p14="http://schemas.microsoft.com/office/powerpoint/2010/main" val="1360839055"/>
       </p:ext>
     </p:extLst>
   </p:cSld>
   <p:clrMapOvr>
     <a:masterClrMapping/>
   </p:clrMapOvr>
-  <mc:AlternateContent xmlns:mc="http://schemas.openxmlformats.org/markup-compatibility/2006">
-    <mc:Choice xmlns:p14="http://schemas.microsoft.com/office/powerpoint/2010/main" Requires="p14">
+  <mc:AlternateContent xmlns:mc="http://schemas.openxmlformats.org/markup-compatibility/2006" xmlns:p14="http://schemas.microsoft.com/office/powerpoint/2010/main">
+    <mc:Choice Requires="p14">
       <p:transition spd="med" p14:dur="700">
         <p:fade/>
       </p:transition>
     </mc:Choice>
-    <mc:Fallback>
+    <mc:Fallback xmlns="">
       <p:transition spd="med">
         <p:fade/>
       </p:transition>
@@ -6614,66 +6095,925 @@
           <a:chExt cx="0" cy="0"/>
         </a:xfrm>
       </p:grpSpPr>
-      <p:sp>
-        <p:nvSpPr>
-          <p:cNvPr id="3" name="Content Placeholder 2"/>
-          <p:cNvSpPr>
-            <a:spLocks noGrp="1"/>
-          </p:cNvSpPr>
-          <p:nvPr>
-            <p:ph sz="half" idx="1"/>
-          </p:nvPr>
-        </p:nvSpPr>
+      <p:pic>
+        <p:nvPicPr>
+          <p:cNvPr id="5" name="Picture 4"/>
+          <p:cNvPicPr>
+            <a:picLocks noChangeAspect="1"/>
+          </p:cNvPicPr>
+          <p:nvPr/>
+        </p:nvPicPr>
+        <p:blipFill>
+          <a:blip r:embed="rId2"/>
+          <a:stretch>
+            <a:fillRect/>
+          </a:stretch>
+        </p:blipFill>
         <p:spPr>
           <a:xfrm>
-            <a:off x="1569700" y="1825625"/>
-            <a:ext cx="10366486" cy="4722132"/>
+            <a:off x="1166812" y="800100"/>
+            <a:ext cx="9858375" cy="5257800"/>
           </a:xfrm>
+          <a:prstGeom prst="rect">
+            <a:avLst/>
+          </a:prstGeom>
         </p:spPr>
-        <p:txBody>
-          <a:bodyPr/>
-          <a:lstStyle/>
-          <a:p>
-            <a:endParaRPr lang="el-GR" dirty="0"/>
-          </a:p>
-        </p:txBody>
-      </p:sp>
-      <p:sp>
-        <p:nvSpPr>
-          <p:cNvPr id="4" name="Title 3"/>
-          <p:cNvSpPr>
-            <a:spLocks noGrp="1"/>
-          </p:cNvSpPr>
-          <p:nvPr>
-            <p:ph type="title"/>
-          </p:nvPr>
-        </p:nvSpPr>
-        <p:spPr/>
-        <p:txBody>
-          <a:bodyPr/>
-          <a:lstStyle/>
-          <a:p>
-            <a:endParaRPr lang="el-GR"/>
-          </a:p>
-        </p:txBody>
-      </p:sp>
+      </p:pic>
     </p:spTree>
     <p:extLst>
       <p:ext uri="{BB962C8B-B14F-4D97-AF65-F5344CB8AC3E}">
-        <p14:creationId xmlns:p14="http://schemas.microsoft.com/office/powerpoint/2010/main" val="1734639870"/>
+        <p14:creationId xmlns:p14="http://schemas.microsoft.com/office/powerpoint/2010/main" val="3562423390"/>
       </p:ext>
     </p:extLst>
   </p:cSld>
   <p:clrMapOvr>
     <a:masterClrMapping/>
   </p:clrMapOvr>
-  <mc:AlternateContent xmlns:mc="http://schemas.openxmlformats.org/markup-compatibility/2006">
-    <mc:Choice xmlns:p14="http://schemas.microsoft.com/office/powerpoint/2010/main" Requires="p14">
+  <mc:AlternateContent xmlns:mc="http://schemas.openxmlformats.org/markup-compatibility/2006" xmlns:p14="http://schemas.microsoft.com/office/powerpoint/2010/main">
+    <mc:Choice Requires="p14">
       <p:transition spd="med" p14:dur="700">
         <p:fade/>
       </p:transition>
     </mc:Choice>
-    <mc:Fallback>
+    <mc:Fallback xmlns="">
+      <p:transition spd="med">
+        <p:fade/>
+      </p:transition>
+    </mc:Fallback>
+  </mc:AlternateContent>
+</p:sld>
+</file>
+
+<file path=ppt/slides/slide24.xml><?xml version="1.0" encoding="utf-8"?>
+<p:sld xmlns:a="http://schemas.openxmlformats.org/drawingml/2006/main" xmlns:r="http://schemas.openxmlformats.org/officeDocument/2006/relationships" xmlns:p="http://schemas.openxmlformats.org/presentationml/2006/main">
+  <p:cSld>
+    <p:spTree>
+      <p:nvGrpSpPr>
+        <p:cNvPr id="1" name=""/>
+        <p:cNvGrpSpPr/>
+        <p:nvPr/>
+      </p:nvGrpSpPr>
+      <p:grpSpPr>
+        <a:xfrm>
+          <a:off x="0" y="0"/>
+          <a:ext cx="0" cy="0"/>
+          <a:chOff x="0" y="0"/>
+          <a:chExt cx="0" cy="0"/>
+        </a:xfrm>
+      </p:grpSpPr>
+      <p:pic>
+        <p:nvPicPr>
+          <p:cNvPr id="5" name="Picture 4"/>
+          <p:cNvPicPr>
+            <a:picLocks noChangeAspect="1"/>
+          </p:cNvPicPr>
+          <p:nvPr/>
+        </p:nvPicPr>
+        <p:blipFill>
+          <a:blip r:embed="rId2"/>
+          <a:stretch>
+            <a:fillRect/>
+          </a:stretch>
+        </p:blipFill>
+        <p:spPr>
+          <a:xfrm>
+            <a:off x="1185862" y="933450"/>
+            <a:ext cx="9820275" cy="4991100"/>
+          </a:xfrm>
+          <a:prstGeom prst="rect">
+            <a:avLst/>
+          </a:prstGeom>
+        </p:spPr>
+      </p:pic>
+    </p:spTree>
+    <p:extLst>
+      <p:ext uri="{BB962C8B-B14F-4D97-AF65-F5344CB8AC3E}">
+        <p14:creationId xmlns:p14="http://schemas.microsoft.com/office/powerpoint/2010/main" val="2616265325"/>
+      </p:ext>
+    </p:extLst>
+  </p:cSld>
+  <p:clrMapOvr>
+    <a:masterClrMapping/>
+  </p:clrMapOvr>
+  <mc:AlternateContent xmlns:mc="http://schemas.openxmlformats.org/markup-compatibility/2006" xmlns:p14="http://schemas.microsoft.com/office/powerpoint/2010/main">
+    <mc:Choice Requires="p14">
+      <p:transition spd="med" p14:dur="700">
+        <p:fade/>
+      </p:transition>
+    </mc:Choice>
+    <mc:Fallback xmlns="">
+      <p:transition spd="med">
+        <p:fade/>
+      </p:transition>
+    </mc:Fallback>
+  </mc:AlternateContent>
+</p:sld>
+</file>
+
+<file path=ppt/slides/slide25.xml><?xml version="1.0" encoding="utf-8"?>
+<p:sld xmlns:a="http://schemas.openxmlformats.org/drawingml/2006/main" xmlns:r="http://schemas.openxmlformats.org/officeDocument/2006/relationships" xmlns:p="http://schemas.openxmlformats.org/presentationml/2006/main">
+  <p:cSld>
+    <p:spTree>
+      <p:nvGrpSpPr>
+        <p:cNvPr id="1" name=""/>
+        <p:cNvGrpSpPr/>
+        <p:nvPr/>
+      </p:nvGrpSpPr>
+      <p:grpSpPr>
+        <a:xfrm>
+          <a:off x="0" y="0"/>
+          <a:ext cx="0" cy="0"/>
+          <a:chOff x="0" y="0"/>
+          <a:chExt cx="0" cy="0"/>
+        </a:xfrm>
+      </p:grpSpPr>
+      <p:pic>
+        <p:nvPicPr>
+          <p:cNvPr id="5" name="Picture 4"/>
+          <p:cNvPicPr>
+            <a:picLocks noChangeAspect="1"/>
+          </p:cNvPicPr>
+          <p:nvPr/>
+        </p:nvPicPr>
+        <p:blipFill>
+          <a:blip r:embed="rId2"/>
+          <a:stretch>
+            <a:fillRect/>
+          </a:stretch>
+        </p:blipFill>
+        <p:spPr>
+          <a:xfrm>
+            <a:off x="1085850" y="833437"/>
+            <a:ext cx="10020300" cy="5191125"/>
+          </a:xfrm>
+          <a:prstGeom prst="rect">
+            <a:avLst/>
+          </a:prstGeom>
+        </p:spPr>
+      </p:pic>
+    </p:spTree>
+    <p:extLst>
+      <p:ext uri="{BB962C8B-B14F-4D97-AF65-F5344CB8AC3E}">
+        <p14:creationId xmlns:p14="http://schemas.microsoft.com/office/powerpoint/2010/main" val="456251708"/>
+      </p:ext>
+    </p:extLst>
+  </p:cSld>
+  <p:clrMapOvr>
+    <a:masterClrMapping/>
+  </p:clrMapOvr>
+  <mc:AlternateContent xmlns:mc="http://schemas.openxmlformats.org/markup-compatibility/2006" xmlns:p14="http://schemas.microsoft.com/office/powerpoint/2010/main">
+    <mc:Choice Requires="p14">
+      <p:transition spd="med" p14:dur="700">
+        <p:fade/>
+      </p:transition>
+    </mc:Choice>
+    <mc:Fallback xmlns="">
+      <p:transition spd="med">
+        <p:fade/>
+      </p:transition>
+    </mc:Fallback>
+  </mc:AlternateContent>
+</p:sld>
+</file>
+
+<file path=ppt/slides/slide26.xml><?xml version="1.0" encoding="utf-8"?>
+<p:sld xmlns:a="http://schemas.openxmlformats.org/drawingml/2006/main" xmlns:r="http://schemas.openxmlformats.org/officeDocument/2006/relationships" xmlns:p="http://schemas.openxmlformats.org/presentationml/2006/main">
+  <p:cSld>
+    <p:spTree>
+      <p:nvGrpSpPr>
+        <p:cNvPr id="1" name=""/>
+        <p:cNvGrpSpPr/>
+        <p:nvPr/>
+      </p:nvGrpSpPr>
+      <p:grpSpPr>
+        <a:xfrm>
+          <a:off x="0" y="0"/>
+          <a:ext cx="0" cy="0"/>
+          <a:chOff x="0" y="0"/>
+          <a:chExt cx="0" cy="0"/>
+        </a:xfrm>
+      </p:grpSpPr>
+      <p:pic>
+        <p:nvPicPr>
+          <p:cNvPr id="5" name="Picture 4"/>
+          <p:cNvPicPr>
+            <a:picLocks noChangeAspect="1"/>
+          </p:cNvPicPr>
+          <p:nvPr/>
+        </p:nvPicPr>
+        <p:blipFill>
+          <a:blip r:embed="rId2"/>
+          <a:stretch>
+            <a:fillRect/>
+          </a:stretch>
+        </p:blipFill>
+        <p:spPr>
+          <a:xfrm>
+            <a:off x="1252537" y="819150"/>
+            <a:ext cx="9686925" cy="5219700"/>
+          </a:xfrm>
+          <a:prstGeom prst="rect">
+            <a:avLst/>
+          </a:prstGeom>
+        </p:spPr>
+      </p:pic>
+    </p:spTree>
+    <p:extLst>
+      <p:ext uri="{BB962C8B-B14F-4D97-AF65-F5344CB8AC3E}">
+        <p14:creationId xmlns:p14="http://schemas.microsoft.com/office/powerpoint/2010/main" val="275539445"/>
+      </p:ext>
+    </p:extLst>
+  </p:cSld>
+  <p:clrMapOvr>
+    <a:masterClrMapping/>
+  </p:clrMapOvr>
+  <mc:AlternateContent xmlns:mc="http://schemas.openxmlformats.org/markup-compatibility/2006" xmlns:p14="http://schemas.microsoft.com/office/powerpoint/2010/main">
+    <mc:Choice Requires="p14">
+      <p:transition spd="med" p14:dur="700">
+        <p:fade/>
+      </p:transition>
+    </mc:Choice>
+    <mc:Fallback xmlns="">
+      <p:transition spd="med">
+        <p:fade/>
+      </p:transition>
+    </mc:Fallback>
+  </mc:AlternateContent>
+</p:sld>
+</file>
+
+<file path=ppt/slides/slide27.xml><?xml version="1.0" encoding="utf-8"?>
+<p:sld xmlns:a="http://schemas.openxmlformats.org/drawingml/2006/main" xmlns:r="http://schemas.openxmlformats.org/officeDocument/2006/relationships" xmlns:p="http://schemas.openxmlformats.org/presentationml/2006/main">
+  <p:cSld>
+    <p:spTree>
+      <p:nvGrpSpPr>
+        <p:cNvPr id="1" name=""/>
+        <p:cNvGrpSpPr/>
+        <p:nvPr/>
+      </p:nvGrpSpPr>
+      <p:grpSpPr>
+        <a:xfrm>
+          <a:off x="0" y="0"/>
+          <a:ext cx="0" cy="0"/>
+          <a:chOff x="0" y="0"/>
+          <a:chExt cx="0" cy="0"/>
+        </a:xfrm>
+      </p:grpSpPr>
+      <p:sp>
+        <p:nvSpPr>
+          <p:cNvPr id="4" name="Title 3"/>
+          <p:cNvSpPr>
+            <a:spLocks noGrp="1"/>
+          </p:cNvSpPr>
+          <p:nvPr>
+            <p:ph type="title"/>
+          </p:nvPr>
+        </p:nvSpPr>
+        <p:spPr>
+          <a:xfrm>
+            <a:off x="4267200" y="2242911"/>
+            <a:ext cx="4860471" cy="1325563"/>
+          </a:xfrm>
+        </p:spPr>
+        <p:txBody>
+          <a:bodyPr/>
+          <a:lstStyle/>
+          <a:p>
+            <a:r>
+              <a:rPr lang="en-US" dirty="0" smtClean="0"/>
+              <a:t>Technologies used</a:t>
+            </a:r>
+            <a:endParaRPr lang="el-GR" dirty="0"/>
+          </a:p>
+        </p:txBody>
+      </p:sp>
+    </p:spTree>
+    <p:extLst>
+      <p:ext uri="{BB962C8B-B14F-4D97-AF65-F5344CB8AC3E}">
+        <p14:creationId xmlns:p14="http://schemas.microsoft.com/office/powerpoint/2010/main" val="3089762453"/>
+      </p:ext>
+    </p:extLst>
+  </p:cSld>
+  <p:clrMapOvr>
+    <a:masterClrMapping/>
+  </p:clrMapOvr>
+  <mc:AlternateContent xmlns:mc="http://schemas.openxmlformats.org/markup-compatibility/2006" xmlns:p14="http://schemas.microsoft.com/office/powerpoint/2010/main">
+    <mc:Choice Requires="p14">
+      <p:transition spd="med" p14:dur="700">
+        <p:fade/>
+      </p:transition>
+    </mc:Choice>
+    <mc:Fallback xmlns="">
+      <p:transition spd="med">
+        <p:fade/>
+      </p:transition>
+    </mc:Fallback>
+  </mc:AlternateContent>
+</p:sld>
+</file>
+
+<file path=ppt/slides/slide28.xml><?xml version="1.0" encoding="utf-8"?>
+<p:sld xmlns:a="http://schemas.openxmlformats.org/drawingml/2006/main" xmlns:r="http://schemas.openxmlformats.org/officeDocument/2006/relationships" xmlns:p="http://schemas.openxmlformats.org/presentationml/2006/main">
+  <p:cSld>
+    <p:spTree>
+      <p:nvGrpSpPr>
+        <p:cNvPr id="1" name=""/>
+        <p:cNvGrpSpPr/>
+        <p:nvPr/>
+      </p:nvGrpSpPr>
+      <p:grpSpPr>
+        <a:xfrm>
+          <a:off x="0" y="0"/>
+          <a:ext cx="0" cy="0"/>
+          <a:chOff x="0" y="0"/>
+          <a:chExt cx="0" cy="0"/>
+        </a:xfrm>
+      </p:grpSpPr>
+      <p:sp>
+        <p:nvSpPr>
+          <p:cNvPr id="3" name="Content Placeholder 2"/>
+          <p:cNvSpPr>
+            <a:spLocks noGrp="1"/>
+          </p:cNvSpPr>
+          <p:nvPr>
+            <p:ph sz="half" idx="1"/>
+          </p:nvPr>
+        </p:nvSpPr>
+        <p:spPr>
+          <a:xfrm>
+            <a:off x="1569700" y="473528"/>
+            <a:ext cx="10268514" cy="6204857"/>
+          </a:xfrm>
+        </p:spPr>
+        <p:txBody>
+          <a:bodyPr>
+            <a:normAutofit fontScale="70000" lnSpcReduction="20000"/>
+          </a:bodyPr>
+          <a:lstStyle/>
+          <a:p>
+            <a:r>
+              <a:rPr lang="en-US" dirty="0" smtClean="0"/>
+              <a:t>Java EE</a:t>
+            </a:r>
+          </a:p>
+          <a:p>
+            <a:pPr lvl="1"/>
+            <a:r>
+              <a:rPr lang="en-US" dirty="0" smtClean="0"/>
+              <a:t>JDK 1.7</a:t>
+            </a:r>
+          </a:p>
+          <a:p>
+            <a:r>
+              <a:rPr lang="en-US" dirty="0"/>
+              <a:t>Apache Tomcat 8</a:t>
+            </a:r>
+          </a:p>
+          <a:p>
+            <a:pPr lvl="1"/>
+            <a:r>
+              <a:rPr lang="en-US" dirty="0">
+                <a:hlinkClick r:id="rId2"/>
+              </a:rPr>
+              <a:t>https://tomcat.apache.org/download-80.cgi</a:t>
+            </a:r>
+            <a:r>
+              <a:rPr lang="en-US" dirty="0"/>
+              <a:t> </a:t>
+            </a:r>
+          </a:p>
+          <a:p>
+            <a:r>
+              <a:rPr lang="en-US" dirty="0"/>
+              <a:t>Eclipse Luna</a:t>
+            </a:r>
+          </a:p>
+          <a:p>
+            <a:pPr lvl="1"/>
+            <a:r>
+              <a:rPr lang="en-US" dirty="0">
+                <a:hlinkClick r:id="rId3"/>
+              </a:rPr>
+              <a:t>http://www.eclipse.org/</a:t>
+            </a:r>
+            <a:r>
+              <a:rPr lang="en-US" dirty="0"/>
+              <a:t> </a:t>
+            </a:r>
+            <a:endParaRPr lang="en-US" dirty="0" smtClean="0"/>
+          </a:p>
+          <a:p>
+            <a:r>
+              <a:rPr lang="en-US" dirty="0" smtClean="0"/>
+              <a:t>PostgreSQL</a:t>
+            </a:r>
+          </a:p>
+          <a:p>
+            <a:pPr lvl="1"/>
+            <a:r>
+              <a:rPr lang="en-US" dirty="0" smtClean="0"/>
+              <a:t>9.4, </a:t>
+            </a:r>
+            <a:r>
+              <a:rPr lang="en-US" dirty="0" err="1" smtClean="0"/>
+              <a:t>jdbc</a:t>
+            </a:r>
+            <a:r>
+              <a:rPr lang="en-US" dirty="0"/>
+              <a:t> driver, </a:t>
+            </a:r>
+            <a:r>
+              <a:rPr lang="en-US" dirty="0">
+                <a:hlinkClick r:id="rId4"/>
+              </a:rPr>
+              <a:t>http://www.postgresql.org</a:t>
+            </a:r>
+            <a:r>
+              <a:rPr lang="en-US" dirty="0" smtClean="0">
+                <a:hlinkClick r:id="rId4"/>
+              </a:rPr>
+              <a:t>/</a:t>
+            </a:r>
+            <a:r>
+              <a:rPr lang="en-US" dirty="0" smtClean="0"/>
+              <a:t> </a:t>
+            </a:r>
+          </a:p>
+          <a:p>
+            <a:r>
+              <a:rPr lang="en-US" dirty="0" smtClean="0"/>
+              <a:t>GitHub</a:t>
+            </a:r>
+          </a:p>
+          <a:p>
+            <a:pPr lvl="1"/>
+            <a:r>
+              <a:rPr lang="en-US" dirty="0" smtClean="0"/>
+              <a:t>GIT eclipse Plugin</a:t>
+            </a:r>
+          </a:p>
+          <a:p>
+            <a:pPr lvl="1"/>
+            <a:r>
+              <a:rPr lang="en-US" dirty="0" smtClean="0"/>
+              <a:t>GIT GUI	</a:t>
+            </a:r>
+          </a:p>
+          <a:p>
+            <a:r>
+              <a:rPr lang="en-US" dirty="0" smtClean="0"/>
+              <a:t>Maven </a:t>
+            </a:r>
+          </a:p>
+          <a:p>
+            <a:pPr lvl="1"/>
+            <a:r>
+              <a:rPr lang="en-US" dirty="0" smtClean="0"/>
+              <a:t>Maven eclipse plugin</a:t>
+            </a:r>
+            <a:r>
+              <a:rPr lang="en-US" dirty="0"/>
+              <a:t>, 3.2.1, </a:t>
+            </a:r>
+            <a:r>
+              <a:rPr lang="en-US" dirty="0">
+                <a:hlinkClick r:id="rId5"/>
+              </a:rPr>
+              <a:t>https://maven.apache.org</a:t>
+            </a:r>
+            <a:r>
+              <a:rPr lang="en-US" dirty="0" smtClean="0">
+                <a:hlinkClick r:id="rId5"/>
+              </a:rPr>
+              <a:t>/</a:t>
+            </a:r>
+            <a:r>
+              <a:rPr lang="en-US" dirty="0" smtClean="0"/>
+              <a:t> </a:t>
+            </a:r>
+          </a:p>
+          <a:p>
+            <a:r>
+              <a:rPr lang="en-US" dirty="0" smtClean="0"/>
+              <a:t>Spring framework</a:t>
+            </a:r>
+          </a:p>
+          <a:p>
+            <a:pPr lvl="1"/>
+            <a:r>
+              <a:rPr lang="en-US" dirty="0"/>
+              <a:t>4.1.4, </a:t>
+            </a:r>
+            <a:r>
+              <a:rPr lang="en-US" dirty="0">
+                <a:hlinkClick r:id="rId6"/>
+              </a:rPr>
+              <a:t>https://spring.io</a:t>
+            </a:r>
+            <a:r>
+              <a:rPr lang="en-US" dirty="0" smtClean="0">
+                <a:hlinkClick r:id="rId6"/>
+              </a:rPr>
+              <a:t>/</a:t>
+            </a:r>
+            <a:r>
+              <a:rPr lang="en-US" dirty="0" smtClean="0"/>
+              <a:t> </a:t>
+            </a:r>
+          </a:p>
+          <a:p>
+            <a:r>
+              <a:rPr lang="en-US" dirty="0" smtClean="0"/>
+              <a:t>Hibernate framework</a:t>
+            </a:r>
+          </a:p>
+          <a:p>
+            <a:pPr lvl="1"/>
+            <a:r>
+              <a:rPr lang="en-US" dirty="0"/>
+              <a:t>4.3.8, </a:t>
+            </a:r>
+            <a:r>
+              <a:rPr lang="en-US" dirty="0">
+                <a:hlinkClick r:id="rId7"/>
+              </a:rPr>
+              <a:t>http://hibernate.org/orm</a:t>
+            </a:r>
+            <a:r>
+              <a:rPr lang="en-US" dirty="0" smtClean="0">
+                <a:hlinkClick r:id="rId7"/>
+              </a:rPr>
+              <a:t>/</a:t>
+            </a:r>
+            <a:r>
+              <a:rPr lang="en-US" dirty="0" smtClean="0"/>
+              <a:t> </a:t>
+            </a:r>
+          </a:p>
+          <a:p>
+            <a:r>
+              <a:rPr lang="en-US" dirty="0" smtClean="0"/>
+              <a:t>Jersey (JAX-RS)</a:t>
+            </a:r>
+          </a:p>
+          <a:p>
+            <a:pPr lvl="1"/>
+            <a:r>
+              <a:rPr lang="en-US" dirty="0"/>
+              <a:t>1.18.3, </a:t>
+            </a:r>
+            <a:r>
+              <a:rPr lang="en-US" dirty="0" smtClean="0"/>
+              <a:t>JSON, </a:t>
+            </a:r>
+            <a:r>
+              <a:rPr lang="en-US" dirty="0" smtClean="0">
+                <a:hlinkClick r:id="rId8"/>
+              </a:rPr>
+              <a:t>https</a:t>
+            </a:r>
+            <a:r>
+              <a:rPr lang="en-US" dirty="0">
+                <a:hlinkClick r:id="rId8"/>
+              </a:rPr>
+              <a:t>://jersey.java.net</a:t>
+            </a:r>
+            <a:r>
+              <a:rPr lang="en-US" dirty="0" smtClean="0">
+                <a:hlinkClick r:id="rId8"/>
+              </a:rPr>
+              <a:t>/</a:t>
+            </a:r>
+            <a:r>
+              <a:rPr lang="en-US" dirty="0" smtClean="0"/>
+              <a:t> </a:t>
+            </a:r>
+          </a:p>
+          <a:p>
+            <a:r>
+              <a:rPr lang="en-US" dirty="0" smtClean="0"/>
+              <a:t>Amazon Web Services</a:t>
+            </a:r>
+          </a:p>
+          <a:p>
+            <a:pPr lvl="1"/>
+            <a:r>
+              <a:rPr lang="en-US" dirty="0"/>
+              <a:t>AWS Java JDK 1.9.22, </a:t>
+            </a:r>
+            <a:r>
+              <a:rPr lang="en-US" dirty="0">
+                <a:hlinkClick r:id="rId9"/>
+              </a:rPr>
+              <a:t>https://aws.amazon.com</a:t>
+            </a:r>
+            <a:r>
+              <a:rPr lang="en-US" dirty="0" smtClean="0">
+                <a:hlinkClick r:id="rId9"/>
+              </a:rPr>
+              <a:t>/</a:t>
+            </a:r>
+            <a:r>
+              <a:rPr lang="en-US" dirty="0" smtClean="0"/>
+              <a:t> </a:t>
+            </a:r>
+          </a:p>
+          <a:p>
+            <a:endParaRPr lang="en-US" dirty="0" smtClean="0"/>
+          </a:p>
+          <a:p>
+            <a:endParaRPr lang="el-GR" dirty="0"/>
+          </a:p>
+        </p:txBody>
+      </p:sp>
+    </p:spTree>
+    <p:extLst>
+      <p:ext uri="{BB962C8B-B14F-4D97-AF65-F5344CB8AC3E}">
+        <p14:creationId xmlns:p14="http://schemas.microsoft.com/office/powerpoint/2010/main" val="3755753112"/>
+      </p:ext>
+    </p:extLst>
+  </p:cSld>
+  <p:clrMapOvr>
+    <a:masterClrMapping/>
+  </p:clrMapOvr>
+  <mc:AlternateContent xmlns:mc="http://schemas.openxmlformats.org/markup-compatibility/2006" xmlns:p14="http://schemas.microsoft.com/office/powerpoint/2010/main">
+    <mc:Choice Requires="p14">
+      <p:transition spd="med" p14:dur="700">
+        <p:fade/>
+      </p:transition>
+    </mc:Choice>
+    <mc:Fallback xmlns="">
+      <p:transition spd="med">
+        <p:fade/>
+      </p:transition>
+    </mc:Fallback>
+  </mc:AlternateContent>
+</p:sld>
+</file>
+
+<file path=ppt/slides/slide29.xml><?xml version="1.0" encoding="utf-8"?>
+<p:sld xmlns:a="http://schemas.openxmlformats.org/drawingml/2006/main" xmlns:r="http://schemas.openxmlformats.org/officeDocument/2006/relationships" xmlns:p="http://schemas.openxmlformats.org/presentationml/2006/main">
+  <p:cSld>
+    <p:spTree>
+      <p:nvGrpSpPr>
+        <p:cNvPr id="1" name=""/>
+        <p:cNvGrpSpPr/>
+        <p:nvPr/>
+      </p:nvGrpSpPr>
+      <p:grpSpPr>
+        <a:xfrm>
+          <a:off x="0" y="0"/>
+          <a:ext cx="0" cy="0"/>
+          <a:chOff x="0" y="0"/>
+          <a:chExt cx="0" cy="0"/>
+        </a:xfrm>
+      </p:grpSpPr>
+      <p:sp>
+        <p:nvSpPr>
+          <p:cNvPr id="3" name="Content Placeholder 2"/>
+          <p:cNvSpPr>
+            <a:spLocks noGrp="1"/>
+          </p:cNvSpPr>
+          <p:nvPr>
+            <p:ph sz="half" idx="1"/>
+          </p:nvPr>
+        </p:nvSpPr>
+        <p:spPr>
+          <a:xfrm>
+            <a:off x="1667671" y="293914"/>
+            <a:ext cx="10235857" cy="6564086"/>
+          </a:xfrm>
+        </p:spPr>
+        <p:txBody>
+          <a:bodyPr>
+            <a:normAutofit fontScale="92500" lnSpcReduction="10000"/>
+          </a:bodyPr>
+          <a:lstStyle/>
+          <a:p>
+            <a:r>
+              <a:rPr lang="en-US" dirty="0" err="1" smtClean="0"/>
+              <a:t>Jasypt</a:t>
+            </a:r>
+            <a:endParaRPr lang="en-US" dirty="0" smtClean="0"/>
+          </a:p>
+          <a:p>
+            <a:pPr lvl="1"/>
+            <a:r>
+              <a:rPr lang="en-US" dirty="0" smtClean="0"/>
+              <a:t>1.9.2</a:t>
+            </a:r>
+            <a:r>
+              <a:rPr lang="en-US" dirty="0"/>
+              <a:t>, Encryption, </a:t>
+            </a:r>
+            <a:r>
+              <a:rPr lang="en-US" dirty="0">
+                <a:hlinkClick r:id="rId2"/>
+              </a:rPr>
+              <a:t>http://www.jasypt.org</a:t>
+            </a:r>
+            <a:r>
+              <a:rPr lang="en-US" dirty="0" smtClean="0">
+                <a:hlinkClick r:id="rId2"/>
+              </a:rPr>
+              <a:t>/</a:t>
+            </a:r>
+            <a:r>
+              <a:rPr lang="en-US" dirty="0" smtClean="0"/>
+              <a:t> </a:t>
+            </a:r>
+          </a:p>
+          <a:p>
+            <a:r>
+              <a:rPr lang="en-US" dirty="0" err="1" smtClean="0"/>
+              <a:t>Joda</a:t>
+            </a:r>
+            <a:endParaRPr lang="en-US" dirty="0" smtClean="0"/>
+          </a:p>
+          <a:p>
+            <a:pPr lvl="1"/>
+            <a:r>
+              <a:rPr lang="en-US" dirty="0" smtClean="0"/>
+              <a:t>2.7, </a:t>
+            </a:r>
+            <a:r>
+              <a:rPr lang="en-US" dirty="0" err="1" smtClean="0"/>
+              <a:t>DateTime</a:t>
+            </a:r>
+            <a:r>
+              <a:rPr lang="en-US" dirty="0"/>
+              <a:t> library, </a:t>
+            </a:r>
+            <a:r>
+              <a:rPr lang="en-US" dirty="0">
+                <a:hlinkClick r:id="rId3"/>
+              </a:rPr>
+              <a:t>http://www.joda.org/joda-time</a:t>
+            </a:r>
+            <a:r>
+              <a:rPr lang="en-US" dirty="0" smtClean="0">
+                <a:hlinkClick r:id="rId3"/>
+              </a:rPr>
+              <a:t>/</a:t>
+            </a:r>
+            <a:r>
+              <a:rPr lang="en-US" dirty="0" smtClean="0"/>
+              <a:t> </a:t>
+            </a:r>
+          </a:p>
+          <a:p>
+            <a:r>
+              <a:rPr lang="en-US" dirty="0" smtClean="0"/>
+              <a:t>Junit</a:t>
+            </a:r>
+          </a:p>
+          <a:p>
+            <a:pPr lvl="1"/>
+            <a:r>
+              <a:rPr lang="en-US" dirty="0"/>
+              <a:t>4.12, </a:t>
+            </a:r>
+            <a:r>
+              <a:rPr lang="en-US" dirty="0">
+                <a:hlinkClick r:id="rId4"/>
+              </a:rPr>
+              <a:t>http://junit.org</a:t>
+            </a:r>
+            <a:r>
+              <a:rPr lang="en-US" dirty="0" smtClean="0">
+                <a:hlinkClick r:id="rId4"/>
+              </a:rPr>
+              <a:t>/</a:t>
+            </a:r>
+            <a:r>
+              <a:rPr lang="en-US" dirty="0" smtClean="0"/>
+              <a:t> </a:t>
+            </a:r>
+          </a:p>
+          <a:p>
+            <a:r>
+              <a:rPr lang="en-US" dirty="0" smtClean="0"/>
+              <a:t>Log4J</a:t>
+            </a:r>
+          </a:p>
+          <a:p>
+            <a:pPr lvl="1"/>
+            <a:r>
+              <a:rPr lang="en-US" dirty="0" smtClean="0"/>
+              <a:t>1.2.17</a:t>
+            </a:r>
+            <a:r>
+              <a:rPr lang="en-US" dirty="0"/>
+              <a:t>, </a:t>
+            </a:r>
+            <a:r>
+              <a:rPr lang="en-US" dirty="0">
+                <a:hlinkClick r:id="rId5"/>
+              </a:rPr>
+              <a:t>http://logging.apache.org/log4j/2.x</a:t>
+            </a:r>
+            <a:r>
+              <a:rPr lang="en-US" dirty="0" smtClean="0">
+                <a:hlinkClick r:id="rId5"/>
+              </a:rPr>
+              <a:t>/</a:t>
+            </a:r>
+            <a:r>
+              <a:rPr lang="en-US" dirty="0" smtClean="0"/>
+              <a:t> </a:t>
+            </a:r>
+          </a:p>
+          <a:p>
+            <a:r>
+              <a:rPr lang="en-US" dirty="0" smtClean="0"/>
+              <a:t>Android Studio</a:t>
+            </a:r>
+          </a:p>
+          <a:p>
+            <a:pPr lvl="1"/>
+            <a:r>
+              <a:rPr lang="en-US" dirty="0"/>
+              <a:t>1.2, </a:t>
+            </a:r>
+            <a:r>
+              <a:rPr lang="en-US" dirty="0">
+                <a:hlinkClick r:id="rId6"/>
+              </a:rPr>
+              <a:t>http://</a:t>
+            </a:r>
+            <a:r>
+              <a:rPr lang="en-US" dirty="0" smtClean="0">
+                <a:hlinkClick r:id="rId6"/>
+              </a:rPr>
+              <a:t>developer.android.com/tools/studio/index.html</a:t>
+            </a:r>
+            <a:r>
+              <a:rPr lang="en-US" dirty="0" smtClean="0"/>
+              <a:t> </a:t>
+            </a:r>
+          </a:p>
+          <a:p>
+            <a:r>
+              <a:rPr lang="en-US" dirty="0" smtClean="0"/>
+              <a:t>Volley</a:t>
+            </a:r>
+          </a:p>
+          <a:p>
+            <a:r>
+              <a:rPr lang="en-US" dirty="0" err="1" smtClean="0"/>
+              <a:t>Gson</a:t>
+            </a:r>
+            <a:endParaRPr lang="en-US" dirty="0" smtClean="0"/>
+          </a:p>
+          <a:p>
+            <a:pPr lvl="1"/>
+            <a:r>
+              <a:rPr lang="en-US" dirty="0" smtClean="0"/>
+              <a:t>2.3.1</a:t>
+            </a:r>
+          </a:p>
+          <a:p>
+            <a:r>
+              <a:rPr lang="en-US" dirty="0" err="1" smtClean="0"/>
+              <a:t>MPAndroidChart</a:t>
+            </a:r>
+            <a:endParaRPr lang="en-US" dirty="0" smtClean="0"/>
+          </a:p>
+          <a:p>
+            <a:pPr lvl="1"/>
+            <a:r>
+              <a:rPr lang="en-US" dirty="0" smtClean="0"/>
+              <a:t>2.0.9</a:t>
+            </a:r>
+          </a:p>
+          <a:p>
+            <a:r>
+              <a:rPr lang="en-US" dirty="0" smtClean="0"/>
+              <a:t>Android API 21</a:t>
+            </a:r>
+          </a:p>
+          <a:p>
+            <a:endParaRPr lang="el-GR" dirty="0"/>
+          </a:p>
+        </p:txBody>
+      </p:sp>
+    </p:spTree>
+    <p:extLst>
+      <p:ext uri="{BB962C8B-B14F-4D97-AF65-F5344CB8AC3E}">
+        <p14:creationId xmlns:p14="http://schemas.microsoft.com/office/powerpoint/2010/main" val="587725017"/>
+      </p:ext>
+    </p:extLst>
+  </p:cSld>
+  <p:clrMapOvr>
+    <a:masterClrMapping/>
+  </p:clrMapOvr>
+  <mc:AlternateContent xmlns:mc="http://schemas.openxmlformats.org/markup-compatibility/2006" xmlns:p14="http://schemas.microsoft.com/office/powerpoint/2010/main">
+    <mc:Choice Requires="p14">
+      <p:transition spd="med" p14:dur="700">
+        <p:fade/>
+      </p:transition>
+    </mc:Choice>
+    <mc:Fallback xmlns="">
       <p:transition spd="med">
         <p:fade/>
       </p:transition>
@@ -6761,6 +7101,459 @@
 </p:sld>
 </file>
 
+<file path=ppt/slides/slide30.xml><?xml version="1.0" encoding="utf-8"?>
+<p:sld xmlns:a="http://schemas.openxmlformats.org/drawingml/2006/main" xmlns:r="http://schemas.openxmlformats.org/officeDocument/2006/relationships" xmlns:p="http://schemas.openxmlformats.org/presentationml/2006/main">
+  <p:cSld>
+    <p:spTree>
+      <p:nvGrpSpPr>
+        <p:cNvPr id="1" name=""/>
+        <p:cNvGrpSpPr/>
+        <p:nvPr/>
+      </p:nvGrpSpPr>
+      <p:grpSpPr>
+        <a:xfrm>
+          <a:off x="0" y="0"/>
+          <a:ext cx="0" cy="0"/>
+          <a:chOff x="0" y="0"/>
+          <a:chExt cx="0" cy="0"/>
+        </a:xfrm>
+      </p:grpSpPr>
+      <p:sp>
+        <p:nvSpPr>
+          <p:cNvPr id="4" name="Title 3"/>
+          <p:cNvSpPr>
+            <a:spLocks noGrp="1"/>
+          </p:cNvSpPr>
+          <p:nvPr>
+            <p:ph type="title"/>
+          </p:nvPr>
+        </p:nvSpPr>
+        <p:spPr>
+          <a:xfrm>
+            <a:off x="2471057" y="2683782"/>
+            <a:ext cx="9029700" cy="1325563"/>
+          </a:xfrm>
+        </p:spPr>
+        <p:txBody>
+          <a:bodyPr/>
+          <a:lstStyle/>
+          <a:p>
+            <a:pPr algn="ctr"/>
+            <a:r>
+              <a:rPr lang="en-US" dirty="0" smtClean="0"/>
+              <a:t>Subjects covered</a:t>
+            </a:r>
+            <a:endParaRPr lang="el-GR" dirty="0"/>
+          </a:p>
+        </p:txBody>
+      </p:sp>
+    </p:spTree>
+    <p:extLst>
+      <p:ext uri="{BB962C8B-B14F-4D97-AF65-F5344CB8AC3E}">
+        <p14:creationId xmlns:p14="http://schemas.microsoft.com/office/powerpoint/2010/main" val="177934842"/>
+      </p:ext>
+    </p:extLst>
+  </p:cSld>
+  <p:clrMapOvr>
+    <a:masterClrMapping/>
+  </p:clrMapOvr>
+  <mc:AlternateContent xmlns:mc="http://schemas.openxmlformats.org/markup-compatibility/2006" xmlns:p14="http://schemas.microsoft.com/office/powerpoint/2010/main">
+    <mc:Choice Requires="p14">
+      <p:transition spd="med" p14:dur="700">
+        <p:fade/>
+      </p:transition>
+    </mc:Choice>
+    <mc:Fallback xmlns="">
+      <p:transition spd="med">
+        <p:fade/>
+      </p:transition>
+    </mc:Fallback>
+  </mc:AlternateContent>
+</p:sld>
+</file>
+
+<file path=ppt/slides/slide31.xml><?xml version="1.0" encoding="utf-8"?>
+<p:sld xmlns:a="http://schemas.openxmlformats.org/drawingml/2006/main" xmlns:r="http://schemas.openxmlformats.org/officeDocument/2006/relationships" xmlns:p="http://schemas.openxmlformats.org/presentationml/2006/main">
+  <p:cSld>
+    <p:spTree>
+      <p:nvGrpSpPr>
+        <p:cNvPr id="1" name=""/>
+        <p:cNvGrpSpPr/>
+        <p:nvPr/>
+      </p:nvGrpSpPr>
+      <p:grpSpPr>
+        <a:xfrm>
+          <a:off x="0" y="0"/>
+          <a:ext cx="0" cy="0"/>
+          <a:chOff x="0" y="0"/>
+          <a:chExt cx="0" cy="0"/>
+        </a:xfrm>
+      </p:grpSpPr>
+      <p:sp>
+        <p:nvSpPr>
+          <p:cNvPr id="3" name="Content Placeholder 2"/>
+          <p:cNvSpPr>
+            <a:spLocks noGrp="1"/>
+          </p:cNvSpPr>
+          <p:nvPr>
+            <p:ph sz="half" idx="1"/>
+          </p:nvPr>
+        </p:nvSpPr>
+        <p:spPr>
+          <a:xfrm>
+            <a:off x="1126671" y="408214"/>
+            <a:ext cx="10662557" cy="6188529"/>
+          </a:xfrm>
+        </p:spPr>
+        <p:txBody>
+          <a:bodyPr>
+            <a:normAutofit lnSpcReduction="10000"/>
+          </a:bodyPr>
+          <a:lstStyle/>
+          <a:p>
+            <a:r>
+              <a:rPr lang="en-US" dirty="0" smtClean="0"/>
+              <a:t>Performance / Scalability</a:t>
+            </a:r>
+          </a:p>
+          <a:p>
+            <a:pPr lvl="1"/>
+            <a:r>
+              <a:rPr lang="en-US" dirty="0" smtClean="0"/>
+              <a:t>Cluster of servers (EC2)</a:t>
+            </a:r>
+          </a:p>
+          <a:p>
+            <a:pPr lvl="1"/>
+            <a:r>
+              <a:rPr lang="en-US" dirty="0" smtClean="0"/>
+              <a:t>Load Balancer (ELB)</a:t>
+            </a:r>
+          </a:p>
+          <a:p>
+            <a:pPr lvl="2"/>
+            <a:r>
+              <a:rPr lang="en-US" dirty="0" smtClean="0"/>
+              <a:t>Single point of failure</a:t>
+            </a:r>
+          </a:p>
+          <a:p>
+            <a:pPr lvl="1"/>
+            <a:r>
+              <a:rPr lang="en-US" dirty="0" smtClean="0"/>
+              <a:t>Cluster of databases (RDS)</a:t>
+            </a:r>
+          </a:p>
+          <a:p>
+            <a:pPr lvl="1"/>
+            <a:r>
+              <a:rPr lang="en-US" dirty="0" smtClean="0"/>
+              <a:t>Scalable Storage Server (S3)</a:t>
+            </a:r>
+          </a:p>
+          <a:p>
+            <a:pPr lvl="1"/>
+            <a:r>
+              <a:rPr lang="en-US" dirty="0" smtClean="0"/>
+              <a:t>REST Services</a:t>
+            </a:r>
+          </a:p>
+          <a:p>
+            <a:r>
+              <a:rPr lang="en-US" dirty="0" smtClean="0"/>
+              <a:t>Replication</a:t>
+            </a:r>
+          </a:p>
+          <a:p>
+            <a:pPr lvl="1"/>
+            <a:r>
+              <a:rPr lang="en-US" dirty="0" smtClean="0"/>
+              <a:t>Database replication (Read Replicas)</a:t>
+            </a:r>
+          </a:p>
+          <a:p>
+            <a:r>
+              <a:rPr lang="en-US" dirty="0" smtClean="0"/>
+              <a:t>Naming</a:t>
+            </a:r>
+          </a:p>
+          <a:p>
+            <a:pPr lvl="1"/>
+            <a:r>
+              <a:rPr lang="en-US" dirty="0" smtClean="0"/>
+              <a:t>We found available </a:t>
+            </a:r>
+            <a:r>
+              <a:rPr lang="en-US" dirty="0"/>
+              <a:t>domain names at </a:t>
+            </a:r>
+            <a:r>
+              <a:rPr lang="en-US" dirty="0" smtClean="0">
+                <a:hlinkClick r:id="rId2"/>
+              </a:rPr>
+              <a:t>https</a:t>
+            </a:r>
+            <a:r>
+              <a:rPr lang="en-US" dirty="0">
+                <a:hlinkClick r:id="rId2"/>
+              </a:rPr>
+              <a:t>://uniregistry.com</a:t>
+            </a:r>
+            <a:r>
+              <a:rPr lang="en-US" dirty="0" smtClean="0">
+                <a:hlinkClick r:id="rId2"/>
+              </a:rPr>
+              <a:t>/</a:t>
+            </a:r>
+            <a:r>
+              <a:rPr lang="en-US" dirty="0" smtClean="0"/>
+              <a:t> (</a:t>
+            </a:r>
+            <a:r>
+              <a:rPr lang="en-US" dirty="0" err="1" smtClean="0"/>
+              <a:t>voteforit.click</a:t>
+            </a:r>
+            <a:r>
+              <a:rPr lang="en-US" dirty="0"/>
+              <a:t> – 1USD), and at </a:t>
+            </a:r>
+            <a:r>
+              <a:rPr lang="en-US" dirty="0">
+                <a:hlinkClick r:id="rId3"/>
+              </a:rPr>
+              <a:t>https://www.papaki.gr</a:t>
+            </a:r>
+            <a:r>
+              <a:rPr lang="en-US" dirty="0" smtClean="0">
+                <a:hlinkClick r:id="rId3"/>
+              </a:rPr>
+              <a:t>/</a:t>
+            </a:r>
+            <a:r>
+              <a:rPr lang="en-US" dirty="0" smtClean="0"/>
+              <a:t> (vote4it.eu – 3 Euros) but we could not purchase it due to Capital Control :P</a:t>
+            </a:r>
+          </a:p>
+          <a:p>
+            <a:pPr lvl="1"/>
+            <a:r>
+              <a:rPr lang="en-US" dirty="0" smtClean="0"/>
+              <a:t>If we had purchased those domain names we would use Amazons’ DNS Servers to translate this domain name to the IP address of our Load Balancer </a:t>
+            </a:r>
+          </a:p>
+          <a:p>
+            <a:pPr lvl="1"/>
+            <a:endParaRPr lang="el-GR" dirty="0"/>
+          </a:p>
+        </p:txBody>
+      </p:sp>
+    </p:spTree>
+    <p:extLst>
+      <p:ext uri="{BB962C8B-B14F-4D97-AF65-F5344CB8AC3E}">
+        <p14:creationId xmlns:p14="http://schemas.microsoft.com/office/powerpoint/2010/main" val="1835869883"/>
+      </p:ext>
+    </p:extLst>
+  </p:cSld>
+  <p:clrMapOvr>
+    <a:masterClrMapping/>
+  </p:clrMapOvr>
+  <mc:AlternateContent xmlns:mc="http://schemas.openxmlformats.org/markup-compatibility/2006" xmlns:p14="http://schemas.microsoft.com/office/powerpoint/2010/main">
+    <mc:Choice Requires="p14">
+      <p:transition spd="med" p14:dur="700">
+        <p:fade/>
+      </p:transition>
+    </mc:Choice>
+    <mc:Fallback xmlns="">
+      <p:transition spd="med">
+        <p:fade/>
+      </p:transition>
+    </mc:Fallback>
+  </mc:AlternateContent>
+</p:sld>
+</file>
+
+<file path=ppt/slides/slide32.xml><?xml version="1.0" encoding="utf-8"?>
+<p:sld xmlns:a="http://schemas.openxmlformats.org/drawingml/2006/main" xmlns:r="http://schemas.openxmlformats.org/officeDocument/2006/relationships" xmlns:p="http://schemas.openxmlformats.org/presentationml/2006/main">
+  <p:cSld>
+    <p:spTree>
+      <p:nvGrpSpPr>
+        <p:cNvPr id="1" name=""/>
+        <p:cNvGrpSpPr/>
+        <p:nvPr/>
+      </p:nvGrpSpPr>
+      <p:grpSpPr>
+        <a:xfrm>
+          <a:off x="0" y="0"/>
+          <a:ext cx="0" cy="0"/>
+          <a:chOff x="0" y="0"/>
+          <a:chExt cx="0" cy="0"/>
+        </a:xfrm>
+      </p:grpSpPr>
+      <p:sp>
+        <p:nvSpPr>
+          <p:cNvPr id="3" name="Content Placeholder 2"/>
+          <p:cNvSpPr>
+            <a:spLocks noGrp="1"/>
+          </p:cNvSpPr>
+          <p:nvPr>
+            <p:ph sz="half" idx="1"/>
+          </p:nvPr>
+        </p:nvSpPr>
+        <p:spPr>
+          <a:xfrm>
+            <a:off x="1112499" y="1028700"/>
+            <a:ext cx="10219529" cy="5568044"/>
+          </a:xfrm>
+        </p:spPr>
+        <p:txBody>
+          <a:bodyPr>
+            <a:normAutofit fontScale="92500" lnSpcReduction="20000"/>
+          </a:bodyPr>
+          <a:lstStyle/>
+          <a:p>
+            <a:r>
+              <a:rPr lang="en-US" dirty="0"/>
+              <a:t> Fault Tolerance</a:t>
+            </a:r>
+          </a:p>
+          <a:p>
+            <a:pPr lvl="1"/>
+            <a:r>
+              <a:rPr lang="en-US" dirty="0" smtClean="0"/>
+              <a:t>Automated database backups</a:t>
+            </a:r>
+          </a:p>
+          <a:p>
+            <a:pPr lvl="1"/>
+            <a:r>
+              <a:rPr lang="en-US" dirty="0" smtClean="0"/>
+              <a:t>If primary database fails read replica becomes primary</a:t>
+            </a:r>
+          </a:p>
+          <a:p>
+            <a:pPr lvl="1"/>
+            <a:r>
+              <a:rPr lang="en-US" dirty="0" smtClean="0"/>
+              <a:t>If one server fails the others can share the load until another server becomes active</a:t>
+            </a:r>
+          </a:p>
+          <a:p>
+            <a:r>
+              <a:rPr lang="en-US" dirty="0" smtClean="0"/>
+              <a:t>Communication</a:t>
+            </a:r>
+          </a:p>
+          <a:p>
+            <a:pPr lvl="1"/>
+            <a:r>
+              <a:rPr lang="en-US" dirty="0" smtClean="0"/>
+              <a:t>REST Services - Stateless</a:t>
+            </a:r>
+          </a:p>
+          <a:p>
+            <a:pPr lvl="1"/>
+            <a:r>
+              <a:rPr lang="en-US" dirty="0" smtClean="0"/>
+              <a:t>HTTP / HTTPS Messages</a:t>
+            </a:r>
+          </a:p>
+          <a:p>
+            <a:pPr lvl="1"/>
+            <a:r>
+              <a:rPr lang="en-US" dirty="0" smtClean="0"/>
+              <a:t>JSON</a:t>
+            </a:r>
+          </a:p>
+          <a:p>
+            <a:pPr lvl="1"/>
+            <a:r>
+              <a:rPr lang="en-US" dirty="0" smtClean="0"/>
+              <a:t>Session-token user authentication</a:t>
+            </a:r>
+          </a:p>
+          <a:p>
+            <a:r>
+              <a:rPr lang="en-US" dirty="0" smtClean="0"/>
+              <a:t>Security</a:t>
+            </a:r>
+          </a:p>
+          <a:p>
+            <a:pPr lvl="1"/>
+            <a:r>
+              <a:rPr lang="en-US" dirty="0" smtClean="0"/>
+              <a:t>SSL (prevent MITM attacks), Self Signed Certificates, .</a:t>
+            </a:r>
+            <a:r>
+              <a:rPr lang="en-US" dirty="0" err="1" smtClean="0"/>
+              <a:t>keystore</a:t>
+            </a:r>
+            <a:r>
+              <a:rPr lang="en-US" dirty="0" smtClean="0"/>
+              <a:t> for tomcat</a:t>
+            </a:r>
+          </a:p>
+          <a:p>
+            <a:pPr lvl="1"/>
+            <a:r>
+              <a:rPr lang="en-US" dirty="0" smtClean="0"/>
+              <a:t>Salt hashing of passwords (prevent rainbow attacks)</a:t>
+            </a:r>
+          </a:p>
+          <a:p>
+            <a:pPr lvl="1"/>
+            <a:r>
+              <a:rPr lang="en-US" dirty="0" smtClean="0"/>
+              <a:t>Advanced Encryption functions</a:t>
+            </a:r>
+          </a:p>
+          <a:p>
+            <a:pPr lvl="1"/>
+            <a:r>
+              <a:rPr lang="en-US" dirty="0" smtClean="0"/>
+              <a:t>Amazon Security Groups (prevent unauthorized access to our instances)</a:t>
+            </a:r>
+          </a:p>
+          <a:p>
+            <a:pPr lvl="1"/>
+            <a:r>
+              <a:rPr lang="en-US" dirty="0" smtClean="0"/>
+              <a:t>IAM (user authentication and access privileges to AWS resources)</a:t>
+            </a:r>
+          </a:p>
+          <a:p>
+            <a:endParaRPr lang="en-US" dirty="0" smtClean="0"/>
+          </a:p>
+          <a:p>
+            <a:pPr lvl="1"/>
+            <a:endParaRPr lang="el-GR" dirty="0"/>
+          </a:p>
+        </p:txBody>
+      </p:sp>
+    </p:spTree>
+    <p:extLst>
+      <p:ext uri="{BB962C8B-B14F-4D97-AF65-F5344CB8AC3E}">
+        <p14:creationId xmlns:p14="http://schemas.microsoft.com/office/powerpoint/2010/main" val="900635408"/>
+      </p:ext>
+    </p:extLst>
+  </p:cSld>
+  <p:clrMapOvr>
+    <a:masterClrMapping/>
+  </p:clrMapOvr>
+  <mc:AlternateContent xmlns:mc="http://schemas.openxmlformats.org/markup-compatibility/2006" xmlns:p14="http://schemas.microsoft.com/office/powerpoint/2010/main">
+    <mc:Choice Requires="p14">
+      <p:transition spd="med" p14:dur="700">
+        <p:fade/>
+      </p:transition>
+    </mc:Choice>
+    <mc:Fallback xmlns="">
+      <p:transition spd="med">
+        <p:fade/>
+      </p:transition>
+    </mc:Fallback>
+  </mc:AlternateContent>
+</p:sld>
+</file>
+
 <file path=ppt/slides/slide4.xml><?xml version="1.0" encoding="utf-8"?>
 <p:sld xmlns:a="http://schemas.openxmlformats.org/drawingml/2006/main" xmlns:r="http://schemas.openxmlformats.org/officeDocument/2006/relationships" xmlns:p="http://schemas.openxmlformats.org/presentationml/2006/main">
   <p:cSld>
@@ -6818,13 +7611,13 @@
   <p:clrMapOvr>
     <a:masterClrMapping/>
   </p:clrMapOvr>
-  <mc:AlternateContent xmlns:mc="http://schemas.openxmlformats.org/markup-compatibility/2006">
-    <mc:Choice xmlns:p14="http://schemas.microsoft.com/office/powerpoint/2010/main" Requires="p14">
+  <mc:AlternateContent xmlns:mc="http://schemas.openxmlformats.org/markup-compatibility/2006" xmlns:p14="http://schemas.microsoft.com/office/powerpoint/2010/main">
+    <mc:Choice Requires="p14">
       <p:transition spd="med" p14:dur="700">
         <p:fade/>
       </p:transition>
     </mc:Choice>
-    <mc:Fallback>
+    <mc:Fallback xmlns="">
       <p:transition spd="med">
         <p:fade/>
       </p:transition>
@@ -6967,13 +7760,13 @@
   <p:clrMapOvr>
     <a:masterClrMapping/>
   </p:clrMapOvr>
-  <mc:AlternateContent xmlns:mc="http://schemas.openxmlformats.org/markup-compatibility/2006">
-    <mc:Choice xmlns:p14="http://schemas.microsoft.com/office/powerpoint/2010/main" Requires="p14">
+  <mc:AlternateContent xmlns:mc="http://schemas.openxmlformats.org/markup-compatibility/2006" xmlns:p14="http://schemas.microsoft.com/office/powerpoint/2010/main">
+    <mc:Choice Requires="p14">
       <p:transition spd="med" p14:dur="700">
         <p:fade/>
       </p:transition>
     </mc:Choice>
-    <mc:Fallback>
+    <mc:Fallback xmlns="">
       <p:transition spd="med">
         <p:fade/>
       </p:transition>
@@ -7184,13 +7977,13 @@
   <p:clrMapOvr>
     <a:masterClrMapping/>
   </p:clrMapOvr>
-  <mc:AlternateContent xmlns:mc="http://schemas.openxmlformats.org/markup-compatibility/2006">
-    <mc:Choice xmlns:p14="http://schemas.microsoft.com/office/powerpoint/2010/main" Requires="p14">
+  <mc:AlternateContent xmlns:mc="http://schemas.openxmlformats.org/markup-compatibility/2006" xmlns:p14="http://schemas.microsoft.com/office/powerpoint/2010/main">
+    <mc:Choice Requires="p14">
       <p:transition spd="med" p14:dur="700">
         <p:fade/>
       </p:transition>
     </mc:Choice>
-    <mc:Fallback>
+    <mc:Fallback xmlns="">
       <p:transition spd="med">
         <p:fade/>
       </p:transition>
@@ -7345,13 +8138,13 @@
   <p:clrMapOvr>
     <a:masterClrMapping/>
   </p:clrMapOvr>
-  <mc:AlternateContent xmlns:mc="http://schemas.openxmlformats.org/markup-compatibility/2006">
-    <mc:Choice xmlns:p14="http://schemas.microsoft.com/office/powerpoint/2010/main" Requires="p14">
+  <mc:AlternateContent xmlns:mc="http://schemas.openxmlformats.org/markup-compatibility/2006" xmlns:p14="http://schemas.microsoft.com/office/powerpoint/2010/main">
+    <mc:Choice Requires="p14">
       <p:transition spd="med" p14:dur="700">
         <p:fade/>
       </p:transition>
     </mc:Choice>
-    <mc:Fallback>
+    <mc:Fallback xmlns="">
       <p:transition spd="med">
         <p:fade/>
       </p:transition>

</xml_diff>